<commit_message>
added new links to linkdump, updated defendense slides
</commit_message>
<xml_diff>
--- a/_defendense_presentation.pptx
+++ b/_defendense_presentation.pptx
@@ -8,8 +8,8 @@
     <p:notesMasterId r:id="rId14"/>
   </p:notesMasterIdLst>
   <p:sldIdLst>
-    <p:sldId id="256" r:id="rId2"/>
-    <p:sldId id="257" r:id="rId3"/>
+    <p:sldId id="257" r:id="rId2"/>
+    <p:sldId id="269" r:id="rId3"/>
     <p:sldId id="258" r:id="rId4"/>
     <p:sldId id="259" r:id="rId5"/>
     <p:sldId id="260" r:id="rId6"/>
@@ -23,6 +23,9 @@
   </p:sldIdLst>
   <p:sldSz cx="12192000" cy="6858000"/>
   <p:notesSz cx="6858000" cy="9144000"/>
+  <p:custDataLst>
+    <p:tags r:id="rId15"/>
+  </p:custDataLst>
   <p:defaultTextStyle>
     <a:defPPr>
       <a:defRPr lang="en-US"/>
@@ -208,7 +211,7 @@
           <a:p>
             <a:fld id="{BDB98AD5-63E8-406E-B0D0-3CBA27A49C51}" type="datetimeFigureOut">
               <a:rPr lang="de-DE" smtClean="0"/>
-              <a:t>11.08.2019</a:t>
+              <a:t>28.08.2019</a:t>
             </a:fld>
             <a:endParaRPr lang="de-DE"/>
           </a:p>
@@ -367,7 +370,7 @@
           <a:p>
             <a:fld id="{BFE7B6AF-8810-4B2F-ADD5-5F91B866FE48}" type="slidenum">
               <a:rPr lang="de-DE" smtClean="0"/>
-              <a:t>‹Nr.›</a:t>
+              <a:t>‹#›</a:t>
             </a:fld>
             <a:endParaRPr lang="de-DE"/>
           </a:p>
@@ -521,100 +524,6 @@
           <a:lstStyle/>
           <a:p>
             <a:r>
-              <a:rPr lang="de-DE" dirty="0" smtClean="0"/>
-              <a:t>Source: </a:t>
-            </a:r>
-            <a:r>
-              <a:rPr lang="de-DE" dirty="0" smtClean="0">
-                <a:hlinkClick r:id="rId3"/>
-              </a:rPr>
-              <a:t>https://gcaptain.com/large-msc-containership-msc-daniela-suffers-fire-off-sri-lanka/</a:t>
-            </a:r>
-            <a:endParaRPr lang="de-DE" dirty="0"/>
-          </a:p>
-        </p:txBody>
-      </p:sp>
-      <p:sp>
-        <p:nvSpPr>
-          <p:cNvPr id="4" name="Foliennummernplatzhalter 3"/>
-          <p:cNvSpPr>
-            <a:spLocks noGrp="1"/>
-          </p:cNvSpPr>
-          <p:nvPr>
-            <p:ph type="sldNum" sz="quarter" idx="10"/>
-          </p:nvPr>
-        </p:nvSpPr>
-        <p:spPr/>
-        <p:txBody>
-          <a:bodyPr/>
-          <a:lstStyle/>
-          <a:p>
-            <a:fld id="{BFE7B6AF-8810-4B2F-ADD5-5F91B866FE48}" type="slidenum">
-              <a:rPr lang="de-DE" smtClean="0"/>
-              <a:t>1</a:t>
-            </a:fld>
-            <a:endParaRPr lang="de-DE" dirty="0"/>
-          </a:p>
-        </p:txBody>
-      </p:sp>
-    </p:spTree>
-    <p:extLst>
-      <p:ext uri="{BB962C8B-B14F-4D97-AF65-F5344CB8AC3E}">
-        <p14:creationId xmlns:p14="http://schemas.microsoft.com/office/powerpoint/2010/main" val="2050831434"/>
-      </p:ext>
-    </p:extLst>
-  </p:cSld>
-  <p:clrMapOvr>
-    <a:masterClrMapping/>
-  </p:clrMapOvr>
-</p:notes>
-</file>
-
-<file path=ppt/notesSlides/notesSlide2.xml><?xml version="1.0" encoding="utf-8"?>
-<p:notes xmlns:a="http://schemas.openxmlformats.org/drawingml/2006/main" xmlns:r="http://schemas.openxmlformats.org/officeDocument/2006/relationships" xmlns:p="http://schemas.openxmlformats.org/presentationml/2006/main">
-  <p:cSld>
-    <p:spTree>
-      <p:nvGrpSpPr>
-        <p:cNvPr id="1" name=""/>
-        <p:cNvGrpSpPr/>
-        <p:nvPr/>
-      </p:nvGrpSpPr>
-      <p:grpSpPr>
-        <a:xfrm>
-          <a:off x="0" y="0"/>
-          <a:ext cx="0" cy="0"/>
-          <a:chOff x="0" y="0"/>
-          <a:chExt cx="0" cy="0"/>
-        </a:xfrm>
-      </p:grpSpPr>
-      <p:sp>
-        <p:nvSpPr>
-          <p:cNvPr id="2" name="Folienbildplatzhalter 1"/>
-          <p:cNvSpPr>
-            <a:spLocks noGrp="1" noRot="1" noChangeAspect="1"/>
-          </p:cNvSpPr>
-          <p:nvPr>
-            <p:ph type="sldImg"/>
-          </p:nvPr>
-        </p:nvSpPr>
-        <p:spPr/>
-      </p:sp>
-      <p:sp>
-        <p:nvSpPr>
-          <p:cNvPr id="3" name="Notizenplatzhalter 2"/>
-          <p:cNvSpPr>
-            <a:spLocks noGrp="1"/>
-          </p:cNvSpPr>
-          <p:nvPr>
-            <p:ph type="body" idx="1"/>
-          </p:nvPr>
-        </p:nvSpPr>
-        <p:spPr/>
-        <p:txBody>
-          <a:bodyPr/>
-          <a:lstStyle/>
-          <a:p>
-            <a:r>
               <a:rPr lang="de-DE" dirty="0" err="1" smtClean="0"/>
               <a:t>Saved</a:t>
             </a:r>
@@ -670,7 +579,7 @@
 </p:notes>
 </file>
 
-<file path=ppt/notesSlides/notesSlide3.xml><?xml version="1.0" encoding="utf-8"?>
+<file path=ppt/notesSlides/notesSlide2.xml><?xml version="1.0" encoding="utf-8"?>
 <p:notes xmlns:a="http://schemas.openxmlformats.org/drawingml/2006/main" xmlns:r="http://schemas.openxmlformats.org/officeDocument/2006/relationships" xmlns:p="http://schemas.openxmlformats.org/presentationml/2006/main">
   <p:cSld>
     <p:spTree>
@@ -932,7 +841,7 @@
           <a:p>
             <a:fld id="{AD526F7C-8FB0-4901-8169-311B03C6DF46}" type="datetimeFigureOut">
               <a:rPr lang="de-DE" smtClean="0"/>
-              <a:t>11.08.2019</a:t>
+              <a:t>28.08.2019</a:t>
             </a:fld>
             <a:endParaRPr lang="de-DE"/>
           </a:p>
@@ -994,7 +903,7 @@
           <a:p>
             <a:fld id="{093C0F04-A77D-472B-A16F-27AD4F58956E}" type="slidenum">
               <a:rPr lang="de-DE" smtClean="0"/>
-              <a:t>‹Nr.›</a:t>
+              <a:t>‹#›</a:t>
             </a:fld>
             <a:endParaRPr lang="de-DE"/>
           </a:p>
@@ -1160,7 +1069,7 @@
           <a:p>
             <a:fld id="{AD526F7C-8FB0-4901-8169-311B03C6DF46}" type="datetimeFigureOut">
               <a:rPr lang="de-DE" smtClean="0"/>
-              <a:t>11.08.2019</a:t>
+              <a:t>28.08.2019</a:t>
             </a:fld>
             <a:endParaRPr lang="de-DE"/>
           </a:p>
@@ -1202,7 +1111,7 @@
           <a:p>
             <a:fld id="{093C0F04-A77D-472B-A16F-27AD4F58956E}" type="slidenum">
               <a:rPr lang="de-DE" smtClean="0"/>
-              <a:t>‹Nr.›</a:t>
+              <a:t>‹#›</a:t>
             </a:fld>
             <a:endParaRPr lang="de-DE"/>
           </a:p>
@@ -1340,7 +1249,7 @@
           <a:p>
             <a:fld id="{AD526F7C-8FB0-4901-8169-311B03C6DF46}" type="datetimeFigureOut">
               <a:rPr lang="de-DE" smtClean="0"/>
-              <a:t>11.08.2019</a:t>
+              <a:t>28.08.2019</a:t>
             </a:fld>
             <a:endParaRPr lang="de-DE"/>
           </a:p>
@@ -1382,7 +1291,7 @@
           <a:p>
             <a:fld id="{093C0F04-A77D-472B-A16F-27AD4F58956E}" type="slidenum">
               <a:rPr lang="de-DE" smtClean="0"/>
-              <a:t>‹Nr.›</a:t>
+              <a:t>‹#›</a:t>
             </a:fld>
             <a:endParaRPr lang="de-DE"/>
           </a:p>
@@ -1510,7 +1419,7 @@
           <a:p>
             <a:fld id="{AD526F7C-8FB0-4901-8169-311B03C6DF46}" type="datetimeFigureOut">
               <a:rPr lang="de-DE" smtClean="0"/>
-              <a:t>11.08.2019</a:t>
+              <a:t>28.08.2019</a:t>
             </a:fld>
             <a:endParaRPr lang="de-DE"/>
           </a:p>
@@ -1552,7 +1461,7 @@
           <a:p>
             <a:fld id="{093C0F04-A77D-472B-A16F-27AD4F58956E}" type="slidenum">
               <a:rPr lang="de-DE" smtClean="0"/>
-              <a:t>‹Nr.›</a:t>
+              <a:t>‹#›</a:t>
             </a:fld>
             <a:endParaRPr lang="de-DE"/>
           </a:p>
@@ -1764,7 +1673,7 @@
           <a:p>
             <a:fld id="{AD526F7C-8FB0-4901-8169-311B03C6DF46}" type="datetimeFigureOut">
               <a:rPr lang="de-DE" smtClean="0"/>
-              <a:t>11.08.2019</a:t>
+              <a:t>28.08.2019</a:t>
             </a:fld>
             <a:endParaRPr lang="de-DE"/>
           </a:p>
@@ -1806,7 +1715,7 @@
           <a:p>
             <a:fld id="{093C0F04-A77D-472B-A16F-27AD4F58956E}" type="slidenum">
               <a:rPr lang="de-DE" smtClean="0"/>
-              <a:t>‹Nr.›</a:t>
+              <a:t>‹#›</a:t>
             </a:fld>
             <a:endParaRPr lang="de-DE"/>
           </a:p>
@@ -2090,7 +1999,7 @@
           <a:p>
             <a:fld id="{AD526F7C-8FB0-4901-8169-311B03C6DF46}" type="datetimeFigureOut">
               <a:rPr lang="de-DE" smtClean="0"/>
-              <a:t>11.08.2019</a:t>
+              <a:t>28.08.2019</a:t>
             </a:fld>
             <a:endParaRPr lang="de-DE"/>
           </a:p>
@@ -2132,7 +2041,7 @@
           <a:p>
             <a:fld id="{093C0F04-A77D-472B-A16F-27AD4F58956E}" type="slidenum">
               <a:rPr lang="de-DE" smtClean="0"/>
-              <a:t>‹Nr.›</a:t>
+              <a:t>‹#›</a:t>
             </a:fld>
             <a:endParaRPr lang="de-DE"/>
           </a:p>
@@ -2541,7 +2450,7 @@
           <a:p>
             <a:fld id="{AD526F7C-8FB0-4901-8169-311B03C6DF46}" type="datetimeFigureOut">
               <a:rPr lang="de-DE" smtClean="0"/>
-              <a:t>11.08.2019</a:t>
+              <a:t>28.08.2019</a:t>
             </a:fld>
             <a:endParaRPr lang="de-DE"/>
           </a:p>
@@ -2583,7 +2492,7 @@
           <a:p>
             <a:fld id="{093C0F04-A77D-472B-A16F-27AD4F58956E}" type="slidenum">
               <a:rPr lang="de-DE" smtClean="0"/>
-              <a:t>‹Nr.›</a:t>
+              <a:t>‹#›</a:t>
             </a:fld>
             <a:endParaRPr lang="de-DE"/>
           </a:p>
@@ -2659,7 +2568,7 @@
           <a:p>
             <a:fld id="{AD526F7C-8FB0-4901-8169-311B03C6DF46}" type="datetimeFigureOut">
               <a:rPr lang="de-DE" smtClean="0"/>
-              <a:t>11.08.2019</a:t>
+              <a:t>28.08.2019</a:t>
             </a:fld>
             <a:endParaRPr lang="de-DE"/>
           </a:p>
@@ -2701,7 +2610,7 @@
           <a:p>
             <a:fld id="{093C0F04-A77D-472B-A16F-27AD4F58956E}" type="slidenum">
               <a:rPr lang="de-DE" smtClean="0"/>
-              <a:t>‹Nr.›</a:t>
+              <a:t>‹#›</a:t>
             </a:fld>
             <a:endParaRPr lang="de-DE"/>
           </a:p>
@@ -2754,7 +2663,7 @@
           <a:p>
             <a:fld id="{AD526F7C-8FB0-4901-8169-311B03C6DF46}" type="datetimeFigureOut">
               <a:rPr lang="de-DE" smtClean="0"/>
-              <a:t>11.08.2019</a:t>
+              <a:t>28.08.2019</a:t>
             </a:fld>
             <a:endParaRPr lang="de-DE"/>
           </a:p>
@@ -2796,7 +2705,7 @@
           <a:p>
             <a:fld id="{093C0F04-A77D-472B-A16F-27AD4F58956E}" type="slidenum">
               <a:rPr lang="de-DE" smtClean="0"/>
-              <a:t>‹Nr.›</a:t>
+              <a:t>‹#›</a:t>
             </a:fld>
             <a:endParaRPr lang="de-DE"/>
           </a:p>
@@ -3041,7 +2950,7 @@
           <a:p>
             <a:fld id="{AD526F7C-8FB0-4901-8169-311B03C6DF46}" type="datetimeFigureOut">
               <a:rPr lang="de-DE" smtClean="0"/>
-              <a:t>11.08.2019</a:t>
+              <a:t>28.08.2019</a:t>
             </a:fld>
             <a:endParaRPr lang="de-DE"/>
           </a:p>
@@ -3083,7 +2992,7 @@
           <a:p>
             <a:fld id="{093C0F04-A77D-472B-A16F-27AD4F58956E}" type="slidenum">
               <a:rPr lang="de-DE" smtClean="0"/>
-              <a:t>‹Nr.›</a:t>
+              <a:t>‹#›</a:t>
             </a:fld>
             <a:endParaRPr lang="de-DE"/>
           </a:p>
@@ -3366,7 +3275,7 @@
           <a:p>
             <a:fld id="{AD526F7C-8FB0-4901-8169-311B03C6DF46}" type="datetimeFigureOut">
               <a:rPr lang="de-DE" smtClean="0"/>
-              <a:t>11.08.2019</a:t>
+              <a:t>28.08.2019</a:t>
             </a:fld>
             <a:endParaRPr lang="de-DE"/>
           </a:p>
@@ -3408,7 +3317,7 @@
           <a:p>
             <a:fld id="{093C0F04-A77D-472B-A16F-27AD4F58956E}" type="slidenum">
               <a:rPr lang="de-DE" smtClean="0"/>
-              <a:t>‹Nr.›</a:t>
+              <a:t>‹#›</a:t>
             </a:fld>
             <a:endParaRPr lang="de-DE"/>
           </a:p>
@@ -3620,7 +3529,7 @@
           <a:p>
             <a:fld id="{AD526F7C-8FB0-4901-8169-311B03C6DF46}" type="datetimeFigureOut">
               <a:rPr lang="de-DE" smtClean="0"/>
-              <a:t>11.08.2019</a:t>
+              <a:t>28.08.2019</a:t>
             </a:fld>
             <a:endParaRPr lang="de-DE"/>
           </a:p>
@@ -3702,7 +3611,7 @@
           <a:p>
             <a:fld id="{093C0F04-A77D-472B-A16F-27AD4F58956E}" type="slidenum">
               <a:rPr lang="de-DE" smtClean="0"/>
-              <a:t>‹Nr.›</a:t>
+              <a:t>‹#›</a:t>
             </a:fld>
             <a:endParaRPr lang="de-DE"/>
           </a:p>
@@ -4108,28 +4017,9 @@
           <a:chExt cx="0" cy="0"/>
         </a:xfrm>
       </p:grpSpPr>
-      <p:sp>
-        <p:nvSpPr>
-          <p:cNvPr id="2" name="Titel 1"/>
-          <p:cNvSpPr>
-            <a:spLocks noGrp="1"/>
-          </p:cNvSpPr>
-          <p:nvPr>
-            <p:ph type="title"/>
-          </p:nvPr>
-        </p:nvSpPr>
-        <p:spPr/>
-        <p:txBody>
-          <a:bodyPr/>
-          <a:lstStyle/>
-          <a:p>
-            <a:endParaRPr lang="de-DE" dirty="0"/>
-          </a:p>
-        </p:txBody>
-      </p:sp>
       <p:pic>
         <p:nvPicPr>
-          <p:cNvPr id="1026" name="Picture 2" descr="http://3kbo302xo3lg2i1rj8450xje-wpengine.netdna-ssl.com/wp-content/uploads/2017/04/MSC-Daniella-800x533.jpg"/>
+          <p:cNvPr id="6" name="Picture 2" descr="http://3kbo302xo3lg2i1rj8450xje-wpengine.netdna-ssl.com/wp-content/uploads/2017/04/MSC-Daniella-800x533.jpg"/>
           <p:cNvPicPr>
             <a:picLocks noGrp="1" noChangeAspect="1" noChangeArrowheads="1"/>
           </p:cNvPicPr>
@@ -4138,7 +4028,7 @@
           </p:nvPr>
         </p:nvPicPr>
         <p:blipFill>
-          <a:blip r:embed="rId3">
+          <a:blip r:embed="rId2">
             <a:extLst>
               <a:ext uri="{28A0092B-C50C-407E-A947-70E740481C1C}">
                 <a14:useLocalDpi xmlns:a14="http://schemas.microsoft.com/office/drawing/2010/main" val="0"/>
@@ -4152,7 +4042,7 @@
         </p:blipFill>
         <p:spPr bwMode="auto">
           <a:xfrm>
-            <a:off x="2293881" y="1828800"/>
+            <a:off x="2783840" y="1102360"/>
             <a:ext cx="6531088" cy="4351338"/>
           </a:xfrm>
           <a:prstGeom prst="rect">
@@ -4173,7 +4063,7 @@
     </p:spTree>
     <p:extLst>
       <p:ext uri="{BB962C8B-B14F-4D97-AF65-F5344CB8AC3E}">
-        <p14:creationId xmlns:p14="http://schemas.microsoft.com/office/powerpoint/2010/main" val="2486284485"/>
+        <p14:creationId xmlns:p14="http://schemas.microsoft.com/office/powerpoint/2010/main" val="2282846199"/>
       </p:ext>
     </p:extLst>
   </p:cSld>
@@ -4547,9 +4437,427 @@
   <p:timing>
     <p:tnLst>
       <p:par>
-        <p:cTn id="1" dur="indefinite" restart="never" nodeType="tmRoot"/>
+        <p:cTn id="1" dur="indefinite" restart="never" nodeType="tmRoot">
+          <p:childTnLst>
+            <p:seq concurrent="1" nextAc="seek">
+              <p:cTn id="2" dur="indefinite" nodeType="mainSeq">
+                <p:childTnLst>
+                  <p:par>
+                    <p:cTn id="3" fill="hold">
+                      <p:stCondLst>
+                        <p:cond delay="indefinite"/>
+                      </p:stCondLst>
+                      <p:childTnLst>
+                        <p:par>
+                          <p:cTn id="4" fill="hold">
+                            <p:stCondLst>
+                              <p:cond delay="0"/>
+                            </p:stCondLst>
+                            <p:childTnLst>
+                              <p:par>
+                                <p:cTn id="5" presetID="1" presetClass="entr" presetSubtype="0" fill="hold" grpId="0" nodeType="clickEffect">
+                                  <p:stCondLst>
+                                    <p:cond delay="0"/>
+                                  </p:stCondLst>
+                                  <p:childTnLst>
+                                    <p:set>
+                                      <p:cBhvr>
+                                        <p:cTn id="6" dur="1" fill="hold">
+                                          <p:stCondLst>
+                                            <p:cond delay="0"/>
+                                          </p:stCondLst>
+                                        </p:cTn>
+                                        <p:tgtEl>
+                                          <p:spTgt spid="3">
+                                            <p:txEl>
+                                              <p:pRg st="0" end="0"/>
+                                            </p:txEl>
+                                          </p:spTgt>
+                                        </p:tgtEl>
+                                        <p:attrNameLst>
+                                          <p:attrName>style.visibility</p:attrName>
+                                        </p:attrNameLst>
+                                      </p:cBhvr>
+                                      <p:to>
+                                        <p:strVal val="visible"/>
+                                      </p:to>
+                                    </p:set>
+                                  </p:childTnLst>
+                                </p:cTn>
+                              </p:par>
+                            </p:childTnLst>
+                          </p:cTn>
+                        </p:par>
+                      </p:childTnLst>
+                    </p:cTn>
+                  </p:par>
+                  <p:par>
+                    <p:cTn id="7" fill="hold">
+                      <p:stCondLst>
+                        <p:cond delay="indefinite"/>
+                      </p:stCondLst>
+                      <p:childTnLst>
+                        <p:par>
+                          <p:cTn id="8" fill="hold">
+                            <p:stCondLst>
+                              <p:cond delay="0"/>
+                            </p:stCondLst>
+                            <p:childTnLst>
+                              <p:par>
+                                <p:cTn id="9" presetID="1" presetClass="entr" presetSubtype="0" fill="hold" grpId="0" nodeType="clickEffect">
+                                  <p:stCondLst>
+                                    <p:cond delay="0"/>
+                                  </p:stCondLst>
+                                  <p:childTnLst>
+                                    <p:set>
+                                      <p:cBhvr>
+                                        <p:cTn id="10" dur="1" fill="hold">
+                                          <p:stCondLst>
+                                            <p:cond delay="0"/>
+                                          </p:stCondLst>
+                                        </p:cTn>
+                                        <p:tgtEl>
+                                          <p:spTgt spid="3">
+                                            <p:txEl>
+                                              <p:pRg st="1" end="1"/>
+                                            </p:txEl>
+                                          </p:spTgt>
+                                        </p:tgtEl>
+                                        <p:attrNameLst>
+                                          <p:attrName>style.visibility</p:attrName>
+                                        </p:attrNameLst>
+                                      </p:cBhvr>
+                                      <p:to>
+                                        <p:strVal val="visible"/>
+                                      </p:to>
+                                    </p:set>
+                                  </p:childTnLst>
+                                </p:cTn>
+                              </p:par>
+                            </p:childTnLst>
+                          </p:cTn>
+                        </p:par>
+                      </p:childTnLst>
+                    </p:cTn>
+                  </p:par>
+                  <p:par>
+                    <p:cTn id="11" fill="hold">
+                      <p:stCondLst>
+                        <p:cond delay="indefinite"/>
+                      </p:stCondLst>
+                      <p:childTnLst>
+                        <p:par>
+                          <p:cTn id="12" fill="hold">
+                            <p:stCondLst>
+                              <p:cond delay="0"/>
+                            </p:stCondLst>
+                            <p:childTnLst>
+                              <p:par>
+                                <p:cTn id="13" presetID="1" presetClass="entr" presetSubtype="0" fill="hold" grpId="0" nodeType="clickEffect">
+                                  <p:stCondLst>
+                                    <p:cond delay="0"/>
+                                  </p:stCondLst>
+                                  <p:childTnLst>
+                                    <p:set>
+                                      <p:cBhvr>
+                                        <p:cTn id="14" dur="1" fill="hold">
+                                          <p:stCondLst>
+                                            <p:cond delay="0"/>
+                                          </p:stCondLst>
+                                        </p:cTn>
+                                        <p:tgtEl>
+                                          <p:spTgt spid="3">
+                                            <p:txEl>
+                                              <p:pRg st="2" end="2"/>
+                                            </p:txEl>
+                                          </p:spTgt>
+                                        </p:tgtEl>
+                                        <p:attrNameLst>
+                                          <p:attrName>style.visibility</p:attrName>
+                                        </p:attrNameLst>
+                                      </p:cBhvr>
+                                      <p:to>
+                                        <p:strVal val="visible"/>
+                                      </p:to>
+                                    </p:set>
+                                  </p:childTnLst>
+                                </p:cTn>
+                              </p:par>
+                            </p:childTnLst>
+                          </p:cTn>
+                        </p:par>
+                      </p:childTnLst>
+                    </p:cTn>
+                  </p:par>
+                  <p:par>
+                    <p:cTn id="15" fill="hold">
+                      <p:stCondLst>
+                        <p:cond delay="indefinite"/>
+                      </p:stCondLst>
+                      <p:childTnLst>
+                        <p:par>
+                          <p:cTn id="16" fill="hold">
+                            <p:stCondLst>
+                              <p:cond delay="0"/>
+                            </p:stCondLst>
+                            <p:childTnLst>
+                              <p:par>
+                                <p:cTn id="17" presetID="1" presetClass="entr" presetSubtype="0" fill="hold" grpId="0" nodeType="clickEffect">
+                                  <p:stCondLst>
+                                    <p:cond delay="0"/>
+                                  </p:stCondLst>
+                                  <p:childTnLst>
+                                    <p:set>
+                                      <p:cBhvr>
+                                        <p:cTn id="18" dur="1" fill="hold">
+                                          <p:stCondLst>
+                                            <p:cond delay="0"/>
+                                          </p:stCondLst>
+                                        </p:cTn>
+                                        <p:tgtEl>
+                                          <p:spTgt spid="3">
+                                            <p:txEl>
+                                              <p:pRg st="4" end="4"/>
+                                            </p:txEl>
+                                          </p:spTgt>
+                                        </p:tgtEl>
+                                        <p:attrNameLst>
+                                          <p:attrName>style.visibility</p:attrName>
+                                        </p:attrNameLst>
+                                      </p:cBhvr>
+                                      <p:to>
+                                        <p:strVal val="visible"/>
+                                      </p:to>
+                                    </p:set>
+                                  </p:childTnLst>
+                                </p:cTn>
+                              </p:par>
+                            </p:childTnLst>
+                          </p:cTn>
+                        </p:par>
+                      </p:childTnLst>
+                    </p:cTn>
+                  </p:par>
+                  <p:par>
+                    <p:cTn id="19" fill="hold">
+                      <p:stCondLst>
+                        <p:cond delay="indefinite"/>
+                      </p:stCondLst>
+                      <p:childTnLst>
+                        <p:par>
+                          <p:cTn id="20" fill="hold">
+                            <p:stCondLst>
+                              <p:cond delay="0"/>
+                            </p:stCondLst>
+                            <p:childTnLst>
+                              <p:par>
+                                <p:cTn id="21" presetID="1" presetClass="entr" presetSubtype="0" fill="hold" grpId="0" nodeType="clickEffect">
+                                  <p:stCondLst>
+                                    <p:cond delay="0"/>
+                                  </p:stCondLst>
+                                  <p:childTnLst>
+                                    <p:set>
+                                      <p:cBhvr>
+                                        <p:cTn id="22" dur="1" fill="hold">
+                                          <p:stCondLst>
+                                            <p:cond delay="0"/>
+                                          </p:stCondLst>
+                                        </p:cTn>
+                                        <p:tgtEl>
+                                          <p:spTgt spid="3">
+                                            <p:txEl>
+                                              <p:pRg st="6" end="6"/>
+                                            </p:txEl>
+                                          </p:spTgt>
+                                        </p:tgtEl>
+                                        <p:attrNameLst>
+                                          <p:attrName>style.visibility</p:attrName>
+                                        </p:attrNameLst>
+                                      </p:cBhvr>
+                                      <p:to>
+                                        <p:strVal val="visible"/>
+                                      </p:to>
+                                    </p:set>
+                                  </p:childTnLst>
+                                </p:cTn>
+                              </p:par>
+                            </p:childTnLst>
+                          </p:cTn>
+                        </p:par>
+                      </p:childTnLst>
+                    </p:cTn>
+                  </p:par>
+                  <p:par>
+                    <p:cTn id="23" fill="hold">
+                      <p:stCondLst>
+                        <p:cond delay="indefinite"/>
+                      </p:stCondLst>
+                      <p:childTnLst>
+                        <p:par>
+                          <p:cTn id="24" fill="hold">
+                            <p:stCondLst>
+                              <p:cond delay="0"/>
+                            </p:stCondLst>
+                            <p:childTnLst>
+                              <p:par>
+                                <p:cTn id="25" presetID="1" presetClass="entr" presetSubtype="0" fill="hold" grpId="0" nodeType="clickEffect">
+                                  <p:stCondLst>
+                                    <p:cond delay="0"/>
+                                  </p:stCondLst>
+                                  <p:childTnLst>
+                                    <p:set>
+                                      <p:cBhvr>
+                                        <p:cTn id="26" dur="1" fill="hold">
+                                          <p:stCondLst>
+                                            <p:cond delay="0"/>
+                                          </p:stCondLst>
+                                        </p:cTn>
+                                        <p:tgtEl>
+                                          <p:spTgt spid="3">
+                                            <p:txEl>
+                                              <p:pRg st="7" end="7"/>
+                                            </p:txEl>
+                                          </p:spTgt>
+                                        </p:tgtEl>
+                                        <p:attrNameLst>
+                                          <p:attrName>style.visibility</p:attrName>
+                                        </p:attrNameLst>
+                                      </p:cBhvr>
+                                      <p:to>
+                                        <p:strVal val="visible"/>
+                                      </p:to>
+                                    </p:set>
+                                  </p:childTnLst>
+                                </p:cTn>
+                              </p:par>
+                            </p:childTnLst>
+                          </p:cTn>
+                        </p:par>
+                      </p:childTnLst>
+                    </p:cTn>
+                  </p:par>
+                  <p:par>
+                    <p:cTn id="27" fill="hold">
+                      <p:stCondLst>
+                        <p:cond delay="indefinite"/>
+                      </p:stCondLst>
+                      <p:childTnLst>
+                        <p:par>
+                          <p:cTn id="28" fill="hold">
+                            <p:stCondLst>
+                              <p:cond delay="0"/>
+                            </p:stCondLst>
+                            <p:childTnLst>
+                              <p:par>
+                                <p:cTn id="29" presetID="1" presetClass="entr" presetSubtype="0" fill="hold" grpId="0" nodeType="clickEffect">
+                                  <p:stCondLst>
+                                    <p:cond delay="0"/>
+                                  </p:stCondLst>
+                                  <p:childTnLst>
+                                    <p:set>
+                                      <p:cBhvr>
+                                        <p:cTn id="30" dur="1" fill="hold">
+                                          <p:stCondLst>
+                                            <p:cond delay="0"/>
+                                          </p:stCondLst>
+                                        </p:cTn>
+                                        <p:tgtEl>
+                                          <p:spTgt spid="3">
+                                            <p:txEl>
+                                              <p:pRg st="8" end="8"/>
+                                            </p:txEl>
+                                          </p:spTgt>
+                                        </p:tgtEl>
+                                        <p:attrNameLst>
+                                          <p:attrName>style.visibility</p:attrName>
+                                        </p:attrNameLst>
+                                      </p:cBhvr>
+                                      <p:to>
+                                        <p:strVal val="visible"/>
+                                      </p:to>
+                                    </p:set>
+                                  </p:childTnLst>
+                                </p:cTn>
+                              </p:par>
+                            </p:childTnLst>
+                          </p:cTn>
+                        </p:par>
+                      </p:childTnLst>
+                    </p:cTn>
+                  </p:par>
+                  <p:par>
+                    <p:cTn id="31" fill="hold">
+                      <p:stCondLst>
+                        <p:cond delay="indefinite"/>
+                      </p:stCondLst>
+                      <p:childTnLst>
+                        <p:par>
+                          <p:cTn id="32" fill="hold">
+                            <p:stCondLst>
+                              <p:cond delay="0"/>
+                            </p:stCondLst>
+                            <p:childTnLst>
+                              <p:par>
+                                <p:cTn id="33" presetID="1" presetClass="entr" presetSubtype="0" fill="hold" grpId="0" nodeType="clickEffect">
+                                  <p:stCondLst>
+                                    <p:cond delay="0"/>
+                                  </p:stCondLst>
+                                  <p:childTnLst>
+                                    <p:set>
+                                      <p:cBhvr>
+                                        <p:cTn id="34" dur="1" fill="hold">
+                                          <p:stCondLst>
+                                            <p:cond delay="0"/>
+                                          </p:stCondLst>
+                                        </p:cTn>
+                                        <p:tgtEl>
+                                          <p:spTgt spid="3">
+                                            <p:txEl>
+                                              <p:pRg st="9" end="9"/>
+                                            </p:txEl>
+                                          </p:spTgt>
+                                        </p:tgtEl>
+                                        <p:attrNameLst>
+                                          <p:attrName>style.visibility</p:attrName>
+                                        </p:attrNameLst>
+                                      </p:cBhvr>
+                                      <p:to>
+                                        <p:strVal val="visible"/>
+                                      </p:to>
+                                    </p:set>
+                                  </p:childTnLst>
+                                </p:cTn>
+                              </p:par>
+                            </p:childTnLst>
+                          </p:cTn>
+                        </p:par>
+                      </p:childTnLst>
+                    </p:cTn>
+                  </p:par>
+                </p:childTnLst>
+              </p:cTn>
+              <p:prevCondLst>
+                <p:cond evt="onPrev" delay="0">
+                  <p:tgtEl>
+                    <p:sldTgt/>
+                  </p:tgtEl>
+                </p:cond>
+              </p:prevCondLst>
+              <p:nextCondLst>
+                <p:cond evt="onNext" delay="0">
+                  <p:tgtEl>
+                    <p:sldTgt/>
+                  </p:tgtEl>
+                </p:cond>
+              </p:nextCondLst>
+            </p:seq>
+          </p:childTnLst>
+        </p:cTn>
       </p:par>
     </p:tnLst>
+    <p:bldLst>
+      <p:bldP spid="3" grpId="0" uiExpand="1" build="p"/>
+    </p:bldLst>
   </p:timing>
 </p:sld>
 </file>
@@ -4683,9 +4991,107 @@
   <p:timing>
     <p:tnLst>
       <p:par>
-        <p:cTn id="1" dur="indefinite" restart="never" nodeType="tmRoot"/>
+        <p:cTn id="1" dur="indefinite" restart="never" nodeType="tmRoot">
+          <p:childTnLst>
+            <p:seq concurrent="1" nextAc="seek">
+              <p:cTn id="2" dur="indefinite" nodeType="mainSeq">
+                <p:childTnLst>
+                  <p:par>
+                    <p:cTn id="3" fill="hold">
+                      <p:stCondLst>
+                        <p:cond delay="indefinite"/>
+                      </p:stCondLst>
+                      <p:childTnLst>
+                        <p:par>
+                          <p:cTn id="4" fill="hold">
+                            <p:stCondLst>
+                              <p:cond delay="0"/>
+                            </p:stCondLst>
+                            <p:childTnLst>
+                              <p:par>
+                                <p:cTn id="5" presetID="1" presetClass="entr" presetSubtype="0" fill="hold" nodeType="clickEffect">
+                                  <p:stCondLst>
+                                    <p:cond delay="0"/>
+                                  </p:stCondLst>
+                                  <p:childTnLst>
+                                    <p:set>
+                                      <p:cBhvr>
+                                        <p:cTn id="6" dur="1" fill="hold">
+                                          <p:stCondLst>
+                                            <p:cond delay="0"/>
+                                          </p:stCondLst>
+                                        </p:cTn>
+                                        <p:tgtEl>
+                                          <p:spTgt spid="6"/>
+                                        </p:tgtEl>
+                                        <p:attrNameLst>
+                                          <p:attrName>style.visibility</p:attrName>
+                                        </p:attrNameLst>
+                                      </p:cBhvr>
+                                      <p:to>
+                                        <p:strVal val="visible"/>
+                                      </p:to>
+                                    </p:set>
+                                  </p:childTnLst>
+                                </p:cTn>
+                              </p:par>
+                              <p:par>
+                                <p:cTn id="7" presetID="1" presetClass="entr" presetSubtype="0" fill="hold" grpId="0" nodeType="withEffect">
+                                  <p:stCondLst>
+                                    <p:cond delay="0"/>
+                                  </p:stCondLst>
+                                  <p:childTnLst>
+                                    <p:set>
+                                      <p:cBhvr>
+                                        <p:cTn id="8" dur="1" fill="hold">
+                                          <p:stCondLst>
+                                            <p:cond delay="0"/>
+                                          </p:stCondLst>
+                                        </p:cTn>
+                                        <p:tgtEl>
+                                          <p:spTgt spid="8"/>
+                                        </p:tgtEl>
+                                        <p:attrNameLst>
+                                          <p:attrName>style.visibility</p:attrName>
+                                        </p:attrNameLst>
+                                      </p:cBhvr>
+                                      <p:to>
+                                        <p:strVal val="visible"/>
+                                      </p:to>
+                                    </p:set>
+                                  </p:childTnLst>
+                                </p:cTn>
+                              </p:par>
+                            </p:childTnLst>
+                          </p:cTn>
+                        </p:par>
+                      </p:childTnLst>
+                    </p:cTn>
+                  </p:par>
+                </p:childTnLst>
+              </p:cTn>
+              <p:prevCondLst>
+                <p:cond evt="onPrev" delay="0">
+                  <p:tgtEl>
+                    <p:sldTgt/>
+                  </p:tgtEl>
+                </p:cond>
+              </p:prevCondLst>
+              <p:nextCondLst>
+                <p:cond evt="onNext" delay="0">
+                  <p:tgtEl>
+                    <p:sldTgt/>
+                  </p:tgtEl>
+                </p:cond>
+              </p:nextCondLst>
+            </p:seq>
+          </p:childTnLst>
+        </p:cTn>
       </p:par>
     </p:tnLst>
+    <p:bldLst>
+      <p:bldP spid="8" grpId="0"/>
+    </p:bldLst>
   </p:timing>
 </p:sld>
 </file>
@@ -4893,7 +5299,7 @@
     </p:spTree>
     <p:extLst>
       <p:ext uri="{BB962C8B-B14F-4D97-AF65-F5344CB8AC3E}">
-        <p14:creationId xmlns:p14="http://schemas.microsoft.com/office/powerpoint/2010/main" val="2282846199"/>
+        <p14:creationId xmlns:p14="http://schemas.microsoft.com/office/powerpoint/2010/main" val="1532823262"/>
       </p:ext>
     </p:extLst>
   </p:cSld>
@@ -5056,9 +5462,378 @@
   <p:timing>
     <p:tnLst>
       <p:par>
-        <p:cTn id="1" dur="indefinite" restart="never" nodeType="tmRoot"/>
+        <p:cTn id="1" dur="indefinite" restart="never" nodeType="tmRoot">
+          <p:childTnLst>
+            <p:seq concurrent="1" nextAc="seek">
+              <p:cTn id="2" dur="indefinite" nodeType="mainSeq">
+                <p:childTnLst>
+                  <p:par>
+                    <p:cTn id="3" fill="hold">
+                      <p:stCondLst>
+                        <p:cond delay="indefinite"/>
+                      </p:stCondLst>
+                      <p:childTnLst>
+                        <p:par>
+                          <p:cTn id="4" fill="hold">
+                            <p:stCondLst>
+                              <p:cond delay="0"/>
+                            </p:stCondLst>
+                            <p:childTnLst>
+                              <p:par>
+                                <p:cTn id="5" presetID="1" presetClass="entr" presetSubtype="0" fill="hold" grpId="0" nodeType="clickEffect">
+                                  <p:stCondLst>
+                                    <p:cond delay="0"/>
+                                  </p:stCondLst>
+                                  <p:childTnLst>
+                                    <p:set>
+                                      <p:cBhvr>
+                                        <p:cTn id="6" dur="1" fill="hold">
+                                          <p:stCondLst>
+                                            <p:cond delay="0"/>
+                                          </p:stCondLst>
+                                        </p:cTn>
+                                        <p:tgtEl>
+                                          <p:spTgt spid="3">
+                                            <p:txEl>
+                                              <p:pRg st="0" end="0"/>
+                                            </p:txEl>
+                                          </p:spTgt>
+                                        </p:tgtEl>
+                                        <p:attrNameLst>
+                                          <p:attrName>style.visibility</p:attrName>
+                                        </p:attrNameLst>
+                                      </p:cBhvr>
+                                      <p:to>
+                                        <p:strVal val="visible"/>
+                                      </p:to>
+                                    </p:set>
+                                  </p:childTnLst>
+                                </p:cTn>
+                              </p:par>
+                            </p:childTnLst>
+                          </p:cTn>
+                        </p:par>
+                      </p:childTnLst>
+                    </p:cTn>
+                  </p:par>
+                  <p:par>
+                    <p:cTn id="7" fill="hold">
+                      <p:stCondLst>
+                        <p:cond delay="indefinite"/>
+                      </p:stCondLst>
+                      <p:childTnLst>
+                        <p:par>
+                          <p:cTn id="8" fill="hold">
+                            <p:stCondLst>
+                              <p:cond delay="0"/>
+                            </p:stCondLst>
+                            <p:childTnLst>
+                              <p:par>
+                                <p:cTn id="9" presetID="1" presetClass="entr" presetSubtype="0" fill="hold" grpId="0" nodeType="clickEffect">
+                                  <p:stCondLst>
+                                    <p:cond delay="0"/>
+                                  </p:stCondLst>
+                                  <p:childTnLst>
+                                    <p:set>
+                                      <p:cBhvr>
+                                        <p:cTn id="10" dur="1" fill="hold">
+                                          <p:stCondLst>
+                                            <p:cond delay="0"/>
+                                          </p:stCondLst>
+                                        </p:cTn>
+                                        <p:tgtEl>
+                                          <p:spTgt spid="3">
+                                            <p:txEl>
+                                              <p:pRg st="1" end="1"/>
+                                            </p:txEl>
+                                          </p:spTgt>
+                                        </p:tgtEl>
+                                        <p:attrNameLst>
+                                          <p:attrName>style.visibility</p:attrName>
+                                        </p:attrNameLst>
+                                      </p:cBhvr>
+                                      <p:to>
+                                        <p:strVal val="visible"/>
+                                      </p:to>
+                                    </p:set>
+                                  </p:childTnLst>
+                                </p:cTn>
+                              </p:par>
+                            </p:childTnLst>
+                          </p:cTn>
+                        </p:par>
+                      </p:childTnLst>
+                    </p:cTn>
+                  </p:par>
+                  <p:par>
+                    <p:cTn id="11" fill="hold">
+                      <p:stCondLst>
+                        <p:cond delay="indefinite"/>
+                      </p:stCondLst>
+                      <p:childTnLst>
+                        <p:par>
+                          <p:cTn id="12" fill="hold">
+                            <p:stCondLst>
+                              <p:cond delay="0"/>
+                            </p:stCondLst>
+                            <p:childTnLst>
+                              <p:par>
+                                <p:cTn id="13" presetID="1" presetClass="entr" presetSubtype="0" fill="hold" grpId="0" nodeType="clickEffect">
+                                  <p:stCondLst>
+                                    <p:cond delay="0"/>
+                                  </p:stCondLst>
+                                  <p:childTnLst>
+                                    <p:set>
+                                      <p:cBhvr>
+                                        <p:cTn id="14" dur="1" fill="hold">
+                                          <p:stCondLst>
+                                            <p:cond delay="0"/>
+                                          </p:stCondLst>
+                                        </p:cTn>
+                                        <p:tgtEl>
+                                          <p:spTgt spid="3">
+                                            <p:txEl>
+                                              <p:pRg st="2" end="2"/>
+                                            </p:txEl>
+                                          </p:spTgt>
+                                        </p:tgtEl>
+                                        <p:attrNameLst>
+                                          <p:attrName>style.visibility</p:attrName>
+                                        </p:attrNameLst>
+                                      </p:cBhvr>
+                                      <p:to>
+                                        <p:strVal val="visible"/>
+                                      </p:to>
+                                    </p:set>
+                                  </p:childTnLst>
+                                </p:cTn>
+                              </p:par>
+                            </p:childTnLst>
+                          </p:cTn>
+                        </p:par>
+                      </p:childTnLst>
+                    </p:cTn>
+                  </p:par>
+                  <p:par>
+                    <p:cTn id="15" fill="hold">
+                      <p:stCondLst>
+                        <p:cond delay="indefinite"/>
+                      </p:stCondLst>
+                      <p:childTnLst>
+                        <p:par>
+                          <p:cTn id="16" fill="hold">
+                            <p:stCondLst>
+                              <p:cond delay="0"/>
+                            </p:stCondLst>
+                            <p:childTnLst>
+                              <p:par>
+                                <p:cTn id="17" presetID="1" presetClass="entr" presetSubtype="0" fill="hold" grpId="0" nodeType="clickEffect">
+                                  <p:stCondLst>
+                                    <p:cond delay="0"/>
+                                  </p:stCondLst>
+                                  <p:childTnLst>
+                                    <p:set>
+                                      <p:cBhvr>
+                                        <p:cTn id="18" dur="1" fill="hold">
+                                          <p:stCondLst>
+                                            <p:cond delay="0"/>
+                                          </p:stCondLst>
+                                        </p:cTn>
+                                        <p:tgtEl>
+                                          <p:spTgt spid="3">
+                                            <p:txEl>
+                                              <p:pRg st="3" end="3"/>
+                                            </p:txEl>
+                                          </p:spTgt>
+                                        </p:tgtEl>
+                                        <p:attrNameLst>
+                                          <p:attrName>style.visibility</p:attrName>
+                                        </p:attrNameLst>
+                                      </p:cBhvr>
+                                      <p:to>
+                                        <p:strVal val="visible"/>
+                                      </p:to>
+                                    </p:set>
+                                  </p:childTnLst>
+                                </p:cTn>
+                              </p:par>
+                            </p:childTnLst>
+                          </p:cTn>
+                        </p:par>
+                      </p:childTnLst>
+                    </p:cTn>
+                  </p:par>
+                  <p:par>
+                    <p:cTn id="19" fill="hold">
+                      <p:stCondLst>
+                        <p:cond delay="indefinite"/>
+                      </p:stCondLst>
+                      <p:childTnLst>
+                        <p:par>
+                          <p:cTn id="20" fill="hold">
+                            <p:stCondLst>
+                              <p:cond delay="0"/>
+                            </p:stCondLst>
+                            <p:childTnLst>
+                              <p:par>
+                                <p:cTn id="21" presetID="1" presetClass="entr" presetSubtype="0" fill="hold" grpId="0" nodeType="clickEffect">
+                                  <p:stCondLst>
+                                    <p:cond delay="0"/>
+                                  </p:stCondLst>
+                                  <p:childTnLst>
+                                    <p:set>
+                                      <p:cBhvr>
+                                        <p:cTn id="22" dur="1" fill="hold">
+                                          <p:stCondLst>
+                                            <p:cond delay="0"/>
+                                          </p:stCondLst>
+                                        </p:cTn>
+                                        <p:tgtEl>
+                                          <p:spTgt spid="3">
+                                            <p:txEl>
+                                              <p:pRg st="4" end="4"/>
+                                            </p:txEl>
+                                          </p:spTgt>
+                                        </p:tgtEl>
+                                        <p:attrNameLst>
+                                          <p:attrName>style.visibility</p:attrName>
+                                        </p:attrNameLst>
+                                      </p:cBhvr>
+                                      <p:to>
+                                        <p:strVal val="visible"/>
+                                      </p:to>
+                                    </p:set>
+                                  </p:childTnLst>
+                                </p:cTn>
+                              </p:par>
+                            </p:childTnLst>
+                          </p:cTn>
+                        </p:par>
+                      </p:childTnLst>
+                    </p:cTn>
+                  </p:par>
+                  <p:par>
+                    <p:cTn id="23" fill="hold">
+                      <p:stCondLst>
+                        <p:cond delay="indefinite"/>
+                      </p:stCondLst>
+                      <p:childTnLst>
+                        <p:par>
+                          <p:cTn id="24" fill="hold">
+                            <p:stCondLst>
+                              <p:cond delay="0"/>
+                            </p:stCondLst>
+                            <p:childTnLst>
+                              <p:par>
+                                <p:cTn id="25" presetID="1" presetClass="entr" presetSubtype="0" fill="hold" grpId="0" nodeType="clickEffect">
+                                  <p:stCondLst>
+                                    <p:cond delay="0"/>
+                                  </p:stCondLst>
+                                  <p:childTnLst>
+                                    <p:set>
+                                      <p:cBhvr>
+                                        <p:cTn id="26" dur="1" fill="hold">
+                                          <p:stCondLst>
+                                            <p:cond delay="0"/>
+                                          </p:stCondLst>
+                                        </p:cTn>
+                                        <p:tgtEl>
+                                          <p:spTgt spid="3">
+                                            <p:txEl>
+                                              <p:pRg st="5" end="5"/>
+                                            </p:txEl>
+                                          </p:spTgt>
+                                        </p:tgtEl>
+                                        <p:attrNameLst>
+                                          <p:attrName>style.visibility</p:attrName>
+                                        </p:attrNameLst>
+                                      </p:cBhvr>
+                                      <p:to>
+                                        <p:strVal val="visible"/>
+                                      </p:to>
+                                    </p:set>
+                                  </p:childTnLst>
+                                </p:cTn>
+                              </p:par>
+                            </p:childTnLst>
+                          </p:cTn>
+                        </p:par>
+                      </p:childTnLst>
+                    </p:cTn>
+                  </p:par>
+                  <p:par>
+                    <p:cTn id="27" fill="hold">
+                      <p:stCondLst>
+                        <p:cond delay="indefinite"/>
+                      </p:stCondLst>
+                      <p:childTnLst>
+                        <p:par>
+                          <p:cTn id="28" fill="hold">
+                            <p:stCondLst>
+                              <p:cond delay="0"/>
+                            </p:stCondLst>
+                            <p:childTnLst>
+                              <p:par>
+                                <p:cTn id="29" presetID="1" presetClass="entr" presetSubtype="0" fill="hold" grpId="0" nodeType="clickEffect">
+                                  <p:stCondLst>
+                                    <p:cond delay="0"/>
+                                  </p:stCondLst>
+                                  <p:childTnLst>
+                                    <p:set>
+                                      <p:cBhvr>
+                                        <p:cTn id="30" dur="1" fill="hold">
+                                          <p:stCondLst>
+                                            <p:cond delay="0"/>
+                                          </p:stCondLst>
+                                        </p:cTn>
+                                        <p:tgtEl>
+                                          <p:spTgt spid="3">
+                                            <p:txEl>
+                                              <p:pRg st="6" end="6"/>
+                                            </p:txEl>
+                                          </p:spTgt>
+                                        </p:tgtEl>
+                                        <p:attrNameLst>
+                                          <p:attrName>style.visibility</p:attrName>
+                                        </p:attrNameLst>
+                                      </p:cBhvr>
+                                      <p:to>
+                                        <p:strVal val="visible"/>
+                                      </p:to>
+                                    </p:set>
+                                  </p:childTnLst>
+                                </p:cTn>
+                              </p:par>
+                            </p:childTnLst>
+                          </p:cTn>
+                        </p:par>
+                      </p:childTnLst>
+                    </p:cTn>
+                  </p:par>
+                </p:childTnLst>
+              </p:cTn>
+              <p:prevCondLst>
+                <p:cond evt="onPrev" delay="0">
+                  <p:tgtEl>
+                    <p:sldTgt/>
+                  </p:tgtEl>
+                </p:cond>
+              </p:prevCondLst>
+              <p:nextCondLst>
+                <p:cond evt="onNext" delay="0">
+                  <p:tgtEl>
+                    <p:sldTgt/>
+                  </p:tgtEl>
+                </p:cond>
+              </p:nextCondLst>
+            </p:seq>
+          </p:childTnLst>
+        </p:cTn>
       </p:par>
     </p:tnLst>
+    <p:bldLst>
+      <p:bldP spid="3" grpId="0" build="p"/>
+    </p:bldLst>
   </p:timing>
 </p:sld>
 </file>
@@ -5382,9 +6157,360 @@
   <p:timing>
     <p:tnLst>
       <p:par>
-        <p:cTn id="1" dur="indefinite" restart="never" nodeType="tmRoot"/>
+        <p:cTn id="1" dur="indefinite" restart="never" nodeType="tmRoot">
+          <p:childTnLst>
+            <p:seq concurrent="1" nextAc="seek">
+              <p:cTn id="2" dur="indefinite" nodeType="mainSeq">
+                <p:childTnLst>
+                  <p:par>
+                    <p:cTn id="3" fill="hold">
+                      <p:stCondLst>
+                        <p:cond delay="indefinite"/>
+                      </p:stCondLst>
+                      <p:childTnLst>
+                        <p:par>
+                          <p:cTn id="4" fill="hold">
+                            <p:stCondLst>
+                              <p:cond delay="0"/>
+                            </p:stCondLst>
+                            <p:childTnLst>
+                              <p:par>
+                                <p:cTn id="5" presetID="1" presetClass="entr" presetSubtype="0" fill="hold" grpId="0" nodeType="clickEffect">
+                                  <p:stCondLst>
+                                    <p:cond delay="0"/>
+                                  </p:stCondLst>
+                                  <p:childTnLst>
+                                    <p:set>
+                                      <p:cBhvr>
+                                        <p:cTn id="6" dur="1" fill="hold">
+                                          <p:stCondLst>
+                                            <p:cond delay="0"/>
+                                          </p:stCondLst>
+                                        </p:cTn>
+                                        <p:tgtEl>
+                                          <p:spTgt spid="3">
+                                            <p:txEl>
+                                              <p:pRg st="0" end="0"/>
+                                            </p:txEl>
+                                          </p:spTgt>
+                                        </p:tgtEl>
+                                        <p:attrNameLst>
+                                          <p:attrName>style.visibility</p:attrName>
+                                        </p:attrNameLst>
+                                      </p:cBhvr>
+                                      <p:to>
+                                        <p:strVal val="visible"/>
+                                      </p:to>
+                                    </p:set>
+                                  </p:childTnLst>
+                                </p:cTn>
+                              </p:par>
+                            </p:childTnLst>
+                          </p:cTn>
+                        </p:par>
+                      </p:childTnLst>
+                    </p:cTn>
+                  </p:par>
+                  <p:par>
+                    <p:cTn id="7" fill="hold">
+                      <p:stCondLst>
+                        <p:cond delay="indefinite"/>
+                      </p:stCondLst>
+                      <p:childTnLst>
+                        <p:par>
+                          <p:cTn id="8" fill="hold">
+                            <p:stCondLst>
+                              <p:cond delay="0"/>
+                            </p:stCondLst>
+                            <p:childTnLst>
+                              <p:par>
+                                <p:cTn id="9" presetID="1" presetClass="entr" presetSubtype="0" fill="hold" grpId="0" nodeType="clickEffect">
+                                  <p:stCondLst>
+                                    <p:cond delay="0"/>
+                                  </p:stCondLst>
+                                  <p:childTnLst>
+                                    <p:set>
+                                      <p:cBhvr>
+                                        <p:cTn id="10" dur="1" fill="hold">
+                                          <p:stCondLst>
+                                            <p:cond delay="0"/>
+                                          </p:stCondLst>
+                                        </p:cTn>
+                                        <p:tgtEl>
+                                          <p:spTgt spid="3">
+                                            <p:txEl>
+                                              <p:pRg st="1" end="1"/>
+                                            </p:txEl>
+                                          </p:spTgt>
+                                        </p:tgtEl>
+                                        <p:attrNameLst>
+                                          <p:attrName>style.visibility</p:attrName>
+                                        </p:attrNameLst>
+                                      </p:cBhvr>
+                                      <p:to>
+                                        <p:strVal val="visible"/>
+                                      </p:to>
+                                    </p:set>
+                                  </p:childTnLst>
+                                </p:cTn>
+                              </p:par>
+                            </p:childTnLst>
+                          </p:cTn>
+                        </p:par>
+                      </p:childTnLst>
+                    </p:cTn>
+                  </p:par>
+                  <p:par>
+                    <p:cTn id="11" fill="hold">
+                      <p:stCondLst>
+                        <p:cond delay="indefinite"/>
+                      </p:stCondLst>
+                      <p:childTnLst>
+                        <p:par>
+                          <p:cTn id="12" fill="hold">
+                            <p:stCondLst>
+                              <p:cond delay="0"/>
+                            </p:stCondLst>
+                            <p:childTnLst>
+                              <p:par>
+                                <p:cTn id="13" presetID="1" presetClass="entr" presetSubtype="0" fill="hold" grpId="0" nodeType="clickEffect">
+                                  <p:stCondLst>
+                                    <p:cond delay="0"/>
+                                  </p:stCondLst>
+                                  <p:childTnLst>
+                                    <p:set>
+                                      <p:cBhvr>
+                                        <p:cTn id="14" dur="1" fill="hold">
+                                          <p:stCondLst>
+                                            <p:cond delay="0"/>
+                                          </p:stCondLst>
+                                        </p:cTn>
+                                        <p:tgtEl>
+                                          <p:spTgt spid="3">
+                                            <p:txEl>
+                                              <p:pRg st="2" end="2"/>
+                                            </p:txEl>
+                                          </p:spTgt>
+                                        </p:tgtEl>
+                                        <p:attrNameLst>
+                                          <p:attrName>style.visibility</p:attrName>
+                                        </p:attrNameLst>
+                                      </p:cBhvr>
+                                      <p:to>
+                                        <p:strVal val="visible"/>
+                                      </p:to>
+                                    </p:set>
+                                  </p:childTnLst>
+                                </p:cTn>
+                              </p:par>
+                            </p:childTnLst>
+                          </p:cTn>
+                        </p:par>
+                      </p:childTnLst>
+                    </p:cTn>
+                  </p:par>
+                  <p:par>
+                    <p:cTn id="15" fill="hold">
+                      <p:stCondLst>
+                        <p:cond delay="indefinite"/>
+                      </p:stCondLst>
+                      <p:childTnLst>
+                        <p:par>
+                          <p:cTn id="16" fill="hold">
+                            <p:stCondLst>
+                              <p:cond delay="0"/>
+                            </p:stCondLst>
+                            <p:childTnLst>
+                              <p:par>
+                                <p:cTn id="17" presetID="1" presetClass="entr" presetSubtype="0" fill="hold" grpId="0" nodeType="clickEffect">
+                                  <p:stCondLst>
+                                    <p:cond delay="0"/>
+                                  </p:stCondLst>
+                                  <p:childTnLst>
+                                    <p:set>
+                                      <p:cBhvr>
+                                        <p:cTn id="18" dur="1" fill="hold">
+                                          <p:stCondLst>
+                                            <p:cond delay="0"/>
+                                          </p:stCondLst>
+                                        </p:cTn>
+                                        <p:tgtEl>
+                                          <p:spTgt spid="3">
+                                            <p:txEl>
+                                              <p:pRg st="3" end="3"/>
+                                            </p:txEl>
+                                          </p:spTgt>
+                                        </p:tgtEl>
+                                        <p:attrNameLst>
+                                          <p:attrName>style.visibility</p:attrName>
+                                        </p:attrNameLst>
+                                      </p:cBhvr>
+                                      <p:to>
+                                        <p:strVal val="visible"/>
+                                      </p:to>
+                                    </p:set>
+                                  </p:childTnLst>
+                                </p:cTn>
+                              </p:par>
+                            </p:childTnLst>
+                          </p:cTn>
+                        </p:par>
+                      </p:childTnLst>
+                    </p:cTn>
+                  </p:par>
+                  <p:par>
+                    <p:cTn id="19" fill="hold">
+                      <p:stCondLst>
+                        <p:cond delay="indefinite"/>
+                      </p:stCondLst>
+                      <p:childTnLst>
+                        <p:par>
+                          <p:cTn id="20" fill="hold">
+                            <p:stCondLst>
+                              <p:cond delay="0"/>
+                            </p:stCondLst>
+                            <p:childTnLst>
+                              <p:par>
+                                <p:cTn id="21" presetID="1" presetClass="entr" presetSubtype="0" fill="hold" grpId="0" nodeType="clickEffect">
+                                  <p:stCondLst>
+                                    <p:cond delay="0"/>
+                                  </p:stCondLst>
+                                  <p:childTnLst>
+                                    <p:set>
+                                      <p:cBhvr>
+                                        <p:cTn id="22" dur="1" fill="hold">
+                                          <p:stCondLst>
+                                            <p:cond delay="0"/>
+                                          </p:stCondLst>
+                                        </p:cTn>
+                                        <p:tgtEl>
+                                          <p:spTgt spid="3">
+                                            <p:txEl>
+                                              <p:pRg st="4" end="4"/>
+                                            </p:txEl>
+                                          </p:spTgt>
+                                        </p:tgtEl>
+                                        <p:attrNameLst>
+                                          <p:attrName>style.visibility</p:attrName>
+                                        </p:attrNameLst>
+                                      </p:cBhvr>
+                                      <p:to>
+                                        <p:strVal val="visible"/>
+                                      </p:to>
+                                    </p:set>
+                                  </p:childTnLst>
+                                </p:cTn>
+                              </p:par>
+                            </p:childTnLst>
+                          </p:cTn>
+                        </p:par>
+                      </p:childTnLst>
+                    </p:cTn>
+                  </p:par>
+                  <p:par>
+                    <p:cTn id="23" fill="hold">
+                      <p:stCondLst>
+                        <p:cond delay="indefinite"/>
+                      </p:stCondLst>
+                      <p:childTnLst>
+                        <p:par>
+                          <p:cTn id="24" fill="hold">
+                            <p:stCondLst>
+                              <p:cond delay="0"/>
+                            </p:stCondLst>
+                            <p:childTnLst>
+                              <p:par>
+                                <p:cTn id="25" presetID="1" presetClass="entr" presetSubtype="0" fill="hold" grpId="0" nodeType="clickEffect">
+                                  <p:stCondLst>
+                                    <p:cond delay="0"/>
+                                  </p:stCondLst>
+                                  <p:childTnLst>
+                                    <p:set>
+                                      <p:cBhvr>
+                                        <p:cTn id="26" dur="1" fill="hold">
+                                          <p:stCondLst>
+                                            <p:cond delay="0"/>
+                                          </p:stCondLst>
+                                        </p:cTn>
+                                        <p:tgtEl>
+                                          <p:spTgt spid="3">
+                                            <p:txEl>
+                                              <p:pRg st="7" end="7"/>
+                                            </p:txEl>
+                                          </p:spTgt>
+                                        </p:tgtEl>
+                                        <p:attrNameLst>
+                                          <p:attrName>style.visibility</p:attrName>
+                                        </p:attrNameLst>
+                                      </p:cBhvr>
+                                      <p:to>
+                                        <p:strVal val="visible"/>
+                                      </p:to>
+                                    </p:set>
+                                  </p:childTnLst>
+                                </p:cTn>
+                              </p:par>
+                              <p:par>
+                                <p:cTn id="27" presetID="1" presetClass="entr" presetSubtype="0" fill="hold" grpId="0" nodeType="withEffect">
+                                  <p:stCondLst>
+                                    <p:cond delay="0"/>
+                                  </p:stCondLst>
+                                  <p:childTnLst>
+                                    <p:set>
+                                      <p:cBhvr>
+                                        <p:cTn id="28" dur="1" fill="hold">
+                                          <p:stCondLst>
+                                            <p:cond delay="0"/>
+                                          </p:stCondLst>
+                                        </p:cTn>
+                                        <p:tgtEl>
+                                          <p:spTgt spid="3">
+                                            <p:txEl>
+                                              <p:pRg st="8" end="8"/>
+                                            </p:txEl>
+                                          </p:spTgt>
+                                        </p:tgtEl>
+                                        <p:attrNameLst>
+                                          <p:attrName>style.visibility</p:attrName>
+                                        </p:attrNameLst>
+                                      </p:cBhvr>
+                                      <p:to>
+                                        <p:strVal val="visible"/>
+                                      </p:to>
+                                    </p:set>
+                                  </p:childTnLst>
+                                </p:cTn>
+                              </p:par>
+                            </p:childTnLst>
+                          </p:cTn>
+                        </p:par>
+                      </p:childTnLst>
+                    </p:cTn>
+                  </p:par>
+                </p:childTnLst>
+              </p:cTn>
+              <p:prevCondLst>
+                <p:cond evt="onPrev" delay="0">
+                  <p:tgtEl>
+                    <p:sldTgt/>
+                  </p:tgtEl>
+                </p:cond>
+              </p:prevCondLst>
+              <p:nextCondLst>
+                <p:cond evt="onNext" delay="0">
+                  <p:tgtEl>
+                    <p:sldTgt/>
+                  </p:tgtEl>
+                </p:cond>
+              </p:nextCondLst>
+            </p:seq>
+          </p:childTnLst>
+        </p:cTn>
       </p:par>
     </p:tnLst>
+    <p:bldLst>
+      <p:bldP spid="3" grpId="0" uiExpand="1" build="p"/>
+    </p:bldLst>
   </p:timing>
 </p:sld>
 </file>
@@ -5637,9 +6763,280 @@
   <p:timing>
     <p:tnLst>
       <p:par>
-        <p:cTn id="1" dur="indefinite" restart="never" nodeType="tmRoot"/>
+        <p:cTn id="1" dur="indefinite" restart="never" nodeType="tmRoot">
+          <p:childTnLst>
+            <p:seq concurrent="1" nextAc="seek">
+              <p:cTn id="2" dur="indefinite" nodeType="mainSeq">
+                <p:childTnLst>
+                  <p:par>
+                    <p:cTn id="3" fill="hold">
+                      <p:stCondLst>
+                        <p:cond delay="indefinite"/>
+                      </p:stCondLst>
+                      <p:childTnLst>
+                        <p:par>
+                          <p:cTn id="4" fill="hold">
+                            <p:stCondLst>
+                              <p:cond delay="0"/>
+                            </p:stCondLst>
+                            <p:childTnLst>
+                              <p:par>
+                                <p:cTn id="5" presetID="1" presetClass="entr" presetSubtype="0" fill="hold" grpId="0" nodeType="clickEffect">
+                                  <p:stCondLst>
+                                    <p:cond delay="0"/>
+                                  </p:stCondLst>
+                                  <p:childTnLst>
+                                    <p:set>
+                                      <p:cBhvr>
+                                        <p:cTn id="6" dur="1" fill="hold">
+                                          <p:stCondLst>
+                                            <p:cond delay="0"/>
+                                          </p:stCondLst>
+                                        </p:cTn>
+                                        <p:tgtEl>
+                                          <p:spTgt spid="3">
+                                            <p:txEl>
+                                              <p:pRg st="0" end="0"/>
+                                            </p:txEl>
+                                          </p:spTgt>
+                                        </p:tgtEl>
+                                        <p:attrNameLst>
+                                          <p:attrName>style.visibility</p:attrName>
+                                        </p:attrNameLst>
+                                      </p:cBhvr>
+                                      <p:to>
+                                        <p:strVal val="visible"/>
+                                      </p:to>
+                                    </p:set>
+                                  </p:childTnLst>
+                                </p:cTn>
+                              </p:par>
+                            </p:childTnLst>
+                          </p:cTn>
+                        </p:par>
+                      </p:childTnLst>
+                    </p:cTn>
+                  </p:par>
+                  <p:par>
+                    <p:cTn id="7" fill="hold">
+                      <p:stCondLst>
+                        <p:cond delay="indefinite"/>
+                      </p:stCondLst>
+                      <p:childTnLst>
+                        <p:par>
+                          <p:cTn id="8" fill="hold">
+                            <p:stCondLst>
+                              <p:cond delay="0"/>
+                            </p:stCondLst>
+                            <p:childTnLst>
+                              <p:par>
+                                <p:cTn id="9" presetID="1" presetClass="entr" presetSubtype="0" fill="hold" grpId="0" nodeType="clickEffect">
+                                  <p:stCondLst>
+                                    <p:cond delay="0"/>
+                                  </p:stCondLst>
+                                  <p:childTnLst>
+                                    <p:set>
+                                      <p:cBhvr>
+                                        <p:cTn id="10" dur="1" fill="hold">
+                                          <p:stCondLst>
+                                            <p:cond delay="0"/>
+                                          </p:stCondLst>
+                                        </p:cTn>
+                                        <p:tgtEl>
+                                          <p:spTgt spid="3">
+                                            <p:txEl>
+                                              <p:pRg st="2" end="2"/>
+                                            </p:txEl>
+                                          </p:spTgt>
+                                        </p:tgtEl>
+                                        <p:attrNameLst>
+                                          <p:attrName>style.visibility</p:attrName>
+                                        </p:attrNameLst>
+                                      </p:cBhvr>
+                                      <p:to>
+                                        <p:strVal val="visible"/>
+                                      </p:to>
+                                    </p:set>
+                                  </p:childTnLst>
+                                </p:cTn>
+                              </p:par>
+                            </p:childTnLst>
+                          </p:cTn>
+                        </p:par>
+                      </p:childTnLst>
+                    </p:cTn>
+                  </p:par>
+                  <p:par>
+                    <p:cTn id="11" fill="hold">
+                      <p:stCondLst>
+                        <p:cond delay="indefinite"/>
+                      </p:stCondLst>
+                      <p:childTnLst>
+                        <p:par>
+                          <p:cTn id="12" fill="hold">
+                            <p:stCondLst>
+                              <p:cond delay="0"/>
+                            </p:stCondLst>
+                            <p:childTnLst>
+                              <p:par>
+                                <p:cTn id="13" presetID="1" presetClass="entr" presetSubtype="0" fill="hold" grpId="0" nodeType="clickEffect">
+                                  <p:stCondLst>
+                                    <p:cond delay="0"/>
+                                  </p:stCondLst>
+                                  <p:childTnLst>
+                                    <p:set>
+                                      <p:cBhvr>
+                                        <p:cTn id="14" dur="1" fill="hold">
+                                          <p:stCondLst>
+                                            <p:cond delay="0"/>
+                                          </p:stCondLst>
+                                        </p:cTn>
+                                        <p:tgtEl>
+                                          <p:spTgt spid="3">
+                                            <p:txEl>
+                                              <p:pRg st="4" end="4"/>
+                                            </p:txEl>
+                                          </p:spTgt>
+                                        </p:tgtEl>
+                                        <p:attrNameLst>
+                                          <p:attrName>style.visibility</p:attrName>
+                                        </p:attrNameLst>
+                                      </p:cBhvr>
+                                      <p:to>
+                                        <p:strVal val="visible"/>
+                                      </p:to>
+                                    </p:set>
+                                  </p:childTnLst>
+                                </p:cTn>
+                              </p:par>
+                            </p:childTnLst>
+                          </p:cTn>
+                        </p:par>
+                      </p:childTnLst>
+                    </p:cTn>
+                  </p:par>
+                  <p:par>
+                    <p:cTn id="15" fill="hold">
+                      <p:stCondLst>
+                        <p:cond delay="indefinite"/>
+                      </p:stCondLst>
+                      <p:childTnLst>
+                        <p:par>
+                          <p:cTn id="16" fill="hold">
+                            <p:stCondLst>
+                              <p:cond delay="0"/>
+                            </p:stCondLst>
+                            <p:childTnLst>
+                              <p:par>
+                                <p:cTn id="17" presetID="1" presetClass="entr" presetSubtype="0" fill="hold" grpId="0" nodeType="clickEffect">
+                                  <p:stCondLst>
+                                    <p:cond delay="0"/>
+                                  </p:stCondLst>
+                                  <p:childTnLst>
+                                    <p:set>
+                                      <p:cBhvr>
+                                        <p:cTn id="18" dur="1" fill="hold">
+                                          <p:stCondLst>
+                                            <p:cond delay="0"/>
+                                          </p:stCondLst>
+                                        </p:cTn>
+                                        <p:tgtEl>
+                                          <p:spTgt spid="3">
+                                            <p:txEl>
+                                              <p:pRg st="7" end="7"/>
+                                            </p:txEl>
+                                          </p:spTgt>
+                                        </p:tgtEl>
+                                        <p:attrNameLst>
+                                          <p:attrName>style.visibility</p:attrName>
+                                        </p:attrNameLst>
+                                      </p:cBhvr>
+                                      <p:to>
+                                        <p:strVal val="visible"/>
+                                      </p:to>
+                                    </p:set>
+                                  </p:childTnLst>
+                                </p:cTn>
+                              </p:par>
+                            </p:childTnLst>
+                          </p:cTn>
+                        </p:par>
+                      </p:childTnLst>
+                    </p:cTn>
+                  </p:par>
+                  <p:par>
+                    <p:cTn id="19" fill="hold">
+                      <p:stCondLst>
+                        <p:cond delay="indefinite"/>
+                      </p:stCondLst>
+                      <p:childTnLst>
+                        <p:par>
+                          <p:cTn id="20" fill="hold">
+                            <p:stCondLst>
+                              <p:cond delay="0"/>
+                            </p:stCondLst>
+                            <p:childTnLst>
+                              <p:par>
+                                <p:cTn id="21" presetID="1" presetClass="entr" presetSubtype="0" fill="hold" grpId="0" nodeType="clickEffect">
+                                  <p:stCondLst>
+                                    <p:cond delay="0"/>
+                                  </p:stCondLst>
+                                  <p:childTnLst>
+                                    <p:set>
+                                      <p:cBhvr>
+                                        <p:cTn id="22" dur="1" fill="hold">
+                                          <p:stCondLst>
+                                            <p:cond delay="0"/>
+                                          </p:stCondLst>
+                                        </p:cTn>
+                                        <p:tgtEl>
+                                          <p:spTgt spid="3">
+                                            <p:txEl>
+                                              <p:pRg st="9" end="9"/>
+                                            </p:txEl>
+                                          </p:spTgt>
+                                        </p:tgtEl>
+                                        <p:attrNameLst>
+                                          <p:attrName>style.visibility</p:attrName>
+                                        </p:attrNameLst>
+                                      </p:cBhvr>
+                                      <p:to>
+                                        <p:strVal val="visible"/>
+                                      </p:to>
+                                    </p:set>
+                                  </p:childTnLst>
+                                </p:cTn>
+                              </p:par>
+                            </p:childTnLst>
+                          </p:cTn>
+                        </p:par>
+                      </p:childTnLst>
+                    </p:cTn>
+                  </p:par>
+                </p:childTnLst>
+              </p:cTn>
+              <p:prevCondLst>
+                <p:cond evt="onPrev" delay="0">
+                  <p:tgtEl>
+                    <p:sldTgt/>
+                  </p:tgtEl>
+                </p:cond>
+              </p:prevCondLst>
+              <p:nextCondLst>
+                <p:cond evt="onNext" delay="0">
+                  <p:tgtEl>
+                    <p:sldTgt/>
+                  </p:tgtEl>
+                </p:cond>
+              </p:nextCondLst>
+            </p:seq>
+          </p:childTnLst>
+        </p:cTn>
       </p:par>
     </p:tnLst>
+    <p:bldLst>
+      <p:bldP spid="3" grpId="0" build="p"/>
+    </p:bldLst>
   </p:timing>
 </p:sld>
 </file>
@@ -6027,7 +7424,226 @@
   <p:timing>
     <p:tnLst>
       <p:par>
-        <p:cTn id="1" dur="indefinite" restart="never" nodeType="tmRoot"/>
+        <p:cTn id="1" dur="indefinite" restart="never" nodeType="tmRoot">
+          <p:childTnLst>
+            <p:seq concurrent="1" nextAc="seek">
+              <p:cTn id="2" dur="indefinite" nodeType="mainSeq">
+                <p:childTnLst>
+                  <p:par>
+                    <p:cTn id="3" fill="hold">
+                      <p:stCondLst>
+                        <p:cond delay="indefinite"/>
+                      </p:stCondLst>
+                      <p:childTnLst>
+                        <p:par>
+                          <p:cTn id="4" fill="hold">
+                            <p:stCondLst>
+                              <p:cond delay="0"/>
+                            </p:stCondLst>
+                            <p:childTnLst>
+                              <p:par>
+                                <p:cTn id="5" presetID="1" presetClass="entr" presetSubtype="0" fill="hold" nodeType="clickEffect">
+                                  <p:stCondLst>
+                                    <p:cond delay="0"/>
+                                  </p:stCondLst>
+                                  <p:childTnLst>
+                                    <p:set>
+                                      <p:cBhvr>
+                                        <p:cTn id="6" dur="1" fill="hold">
+                                          <p:stCondLst>
+                                            <p:cond delay="0"/>
+                                          </p:stCondLst>
+                                        </p:cTn>
+                                        <p:tgtEl>
+                                          <p:spTgt spid="3">
+                                            <p:txEl>
+                                              <p:pRg st="3" end="3"/>
+                                            </p:txEl>
+                                          </p:spTgt>
+                                        </p:tgtEl>
+                                        <p:attrNameLst>
+                                          <p:attrName>style.visibility</p:attrName>
+                                        </p:attrNameLst>
+                                      </p:cBhvr>
+                                      <p:to>
+                                        <p:strVal val="visible"/>
+                                      </p:to>
+                                    </p:set>
+                                  </p:childTnLst>
+                                </p:cTn>
+                              </p:par>
+                            </p:childTnLst>
+                          </p:cTn>
+                        </p:par>
+                      </p:childTnLst>
+                    </p:cTn>
+                  </p:par>
+                  <p:par>
+                    <p:cTn id="7" fill="hold">
+                      <p:stCondLst>
+                        <p:cond delay="indefinite"/>
+                      </p:stCondLst>
+                      <p:childTnLst>
+                        <p:par>
+                          <p:cTn id="8" fill="hold">
+                            <p:stCondLst>
+                              <p:cond delay="0"/>
+                            </p:stCondLst>
+                            <p:childTnLst>
+                              <p:par>
+                                <p:cTn id="9" presetID="1" presetClass="entr" presetSubtype="0" fill="hold" nodeType="clickEffect">
+                                  <p:stCondLst>
+                                    <p:cond delay="0"/>
+                                  </p:stCondLst>
+                                  <p:childTnLst>
+                                    <p:set>
+                                      <p:cBhvr>
+                                        <p:cTn id="10" dur="1" fill="hold">
+                                          <p:stCondLst>
+                                            <p:cond delay="0"/>
+                                          </p:stCondLst>
+                                        </p:cTn>
+                                        <p:tgtEl>
+                                          <p:spTgt spid="3">
+                                            <p:txEl>
+                                              <p:pRg st="5" end="5"/>
+                                            </p:txEl>
+                                          </p:spTgt>
+                                        </p:tgtEl>
+                                        <p:attrNameLst>
+                                          <p:attrName>style.visibility</p:attrName>
+                                        </p:attrNameLst>
+                                      </p:cBhvr>
+                                      <p:to>
+                                        <p:strVal val="visible"/>
+                                      </p:to>
+                                    </p:set>
+                                  </p:childTnLst>
+                                </p:cTn>
+                              </p:par>
+                            </p:childTnLst>
+                          </p:cTn>
+                        </p:par>
+                      </p:childTnLst>
+                    </p:cTn>
+                  </p:par>
+                  <p:par>
+                    <p:cTn id="11" fill="hold">
+                      <p:stCondLst>
+                        <p:cond delay="indefinite"/>
+                      </p:stCondLst>
+                      <p:childTnLst>
+                        <p:par>
+                          <p:cTn id="12" fill="hold">
+                            <p:stCondLst>
+                              <p:cond delay="0"/>
+                            </p:stCondLst>
+                            <p:childTnLst>
+                              <p:par>
+                                <p:cTn id="13" presetID="1" presetClass="entr" presetSubtype="0" fill="hold" nodeType="clickEffect">
+                                  <p:stCondLst>
+                                    <p:cond delay="0"/>
+                                  </p:stCondLst>
+                                  <p:childTnLst>
+                                    <p:set>
+                                      <p:cBhvr>
+                                        <p:cTn id="14" dur="1" fill="hold">
+                                          <p:stCondLst>
+                                            <p:cond delay="0"/>
+                                          </p:stCondLst>
+                                        </p:cTn>
+                                        <p:tgtEl>
+                                          <p:spTgt spid="3">
+                                            <p:txEl>
+                                              <p:pRg st="6" end="6"/>
+                                            </p:txEl>
+                                          </p:spTgt>
+                                        </p:tgtEl>
+                                        <p:attrNameLst>
+                                          <p:attrName>style.visibility</p:attrName>
+                                        </p:attrNameLst>
+                                      </p:cBhvr>
+                                      <p:to>
+                                        <p:strVal val="visible"/>
+                                      </p:to>
+                                    </p:set>
+                                  </p:childTnLst>
+                                </p:cTn>
+                              </p:par>
+                            </p:childTnLst>
+                          </p:cTn>
+                        </p:par>
+                      </p:childTnLst>
+                    </p:cTn>
+                  </p:par>
+                  <p:par>
+                    <p:cTn id="15" fill="hold">
+                      <p:stCondLst>
+                        <p:cond delay="indefinite"/>
+                      </p:stCondLst>
+                      <p:childTnLst>
+                        <p:par>
+                          <p:cTn id="16" fill="hold">
+                            <p:stCondLst>
+                              <p:cond delay="0"/>
+                            </p:stCondLst>
+                            <p:childTnLst>
+                              <p:par>
+                                <p:cTn id="17" presetID="1" presetClass="entr" presetSubtype="0" fill="hold" nodeType="clickEffect">
+                                  <p:stCondLst>
+                                    <p:cond delay="0"/>
+                                  </p:stCondLst>
+                                  <p:childTnLst>
+                                    <p:set>
+                                      <p:cBhvr>
+                                        <p:cTn id="18" dur="1" fill="hold">
+                                          <p:stCondLst>
+                                            <p:cond delay="0"/>
+                                          </p:stCondLst>
+                                        </p:cTn>
+                                        <p:tgtEl>
+                                          <p:spTgt spid="3">
+                                            <p:txEl>
+                                              <p:pRg st="8" end="8"/>
+                                            </p:txEl>
+                                          </p:spTgt>
+                                        </p:tgtEl>
+                                        <p:attrNameLst>
+                                          <p:attrName>style.visibility</p:attrName>
+                                        </p:attrNameLst>
+                                      </p:cBhvr>
+                                      <p:to>
+                                        <p:strVal val="visible"/>
+                                      </p:to>
+                                    </p:set>
+                                  </p:childTnLst>
+                                </p:cTn>
+                              </p:par>
+                            </p:childTnLst>
+                          </p:cTn>
+                        </p:par>
+                      </p:childTnLst>
+                    </p:cTn>
+                  </p:par>
+                </p:childTnLst>
+              </p:cTn>
+              <p:prevCondLst>
+                <p:cond evt="onPrev" delay="0">
+                  <p:tgtEl>
+                    <p:sldTgt/>
+                  </p:tgtEl>
+                </p:cond>
+              </p:prevCondLst>
+              <p:nextCondLst>
+                <p:cond evt="onNext" delay="0">
+                  <p:tgtEl>
+                    <p:sldTgt/>
+                  </p:tgtEl>
+                </p:cond>
+              </p:nextCondLst>
+            </p:seq>
+          </p:childTnLst>
+        </p:cTn>
       </p:par>
     </p:tnLst>
   </p:timing>
@@ -6251,7 +7867,7 @@
             </a:r>
             <a:r>
               <a:rPr lang="de-DE" dirty="0" err="1"/>
-              <a:t>to</a:t>
+              <a:t>into</a:t>
             </a:r>
             <a:r>
               <a:rPr lang="de-DE" dirty="0"/>
@@ -7004,9 +8620,485 @@
   <p:timing>
     <p:tnLst>
       <p:par>
-        <p:cTn id="1" dur="indefinite" restart="never" nodeType="tmRoot"/>
+        <p:cTn id="1" dur="indefinite" restart="never" nodeType="tmRoot">
+          <p:childTnLst>
+            <p:seq concurrent="1" nextAc="seek">
+              <p:cTn id="2" dur="indefinite" nodeType="mainSeq">
+                <p:childTnLst>
+                  <p:par>
+                    <p:cTn id="3" fill="hold">
+                      <p:stCondLst>
+                        <p:cond delay="indefinite"/>
+                      </p:stCondLst>
+                      <p:childTnLst>
+                        <p:par>
+                          <p:cTn id="4" fill="hold">
+                            <p:stCondLst>
+                              <p:cond delay="0"/>
+                            </p:stCondLst>
+                            <p:childTnLst>
+                              <p:par>
+                                <p:cTn id="5" presetID="1" presetClass="entr" presetSubtype="0" fill="hold" grpId="0" nodeType="clickEffect">
+                                  <p:stCondLst>
+                                    <p:cond delay="0"/>
+                                  </p:stCondLst>
+                                  <p:childTnLst>
+                                    <p:set>
+                                      <p:cBhvr>
+                                        <p:cTn id="6" dur="1" fill="hold">
+                                          <p:stCondLst>
+                                            <p:cond delay="0"/>
+                                          </p:stCondLst>
+                                        </p:cTn>
+                                        <p:tgtEl>
+                                          <p:spTgt spid="4">
+                                            <p:txEl>
+                                              <p:pRg st="0" end="0"/>
+                                            </p:txEl>
+                                          </p:spTgt>
+                                        </p:tgtEl>
+                                        <p:attrNameLst>
+                                          <p:attrName>style.visibility</p:attrName>
+                                        </p:attrNameLst>
+                                      </p:cBhvr>
+                                      <p:to>
+                                        <p:strVal val="visible"/>
+                                      </p:to>
+                                    </p:set>
+                                  </p:childTnLst>
+                                </p:cTn>
+                              </p:par>
+                              <p:par>
+                                <p:cTn id="7" presetID="1" presetClass="entr" presetSubtype="0" fill="hold" grpId="0" nodeType="withEffect">
+                                  <p:stCondLst>
+                                    <p:cond delay="0"/>
+                                  </p:stCondLst>
+                                  <p:childTnLst>
+                                    <p:set>
+                                      <p:cBhvr>
+                                        <p:cTn id="8" dur="1" fill="hold">
+                                          <p:stCondLst>
+                                            <p:cond delay="0"/>
+                                          </p:stCondLst>
+                                        </p:cTn>
+                                        <p:tgtEl>
+                                          <p:spTgt spid="6">
+                                            <p:txEl>
+                                              <p:pRg st="0" end="0"/>
+                                            </p:txEl>
+                                          </p:spTgt>
+                                        </p:tgtEl>
+                                        <p:attrNameLst>
+                                          <p:attrName>style.visibility</p:attrName>
+                                        </p:attrNameLst>
+                                      </p:cBhvr>
+                                      <p:to>
+                                        <p:strVal val="visible"/>
+                                      </p:to>
+                                    </p:set>
+                                  </p:childTnLst>
+                                </p:cTn>
+                              </p:par>
+                            </p:childTnLst>
+                          </p:cTn>
+                        </p:par>
+                      </p:childTnLst>
+                    </p:cTn>
+                  </p:par>
+                  <p:par>
+                    <p:cTn id="9" fill="hold">
+                      <p:stCondLst>
+                        <p:cond delay="indefinite"/>
+                      </p:stCondLst>
+                      <p:childTnLst>
+                        <p:par>
+                          <p:cTn id="10" fill="hold">
+                            <p:stCondLst>
+                              <p:cond delay="0"/>
+                            </p:stCondLst>
+                            <p:childTnLst>
+                              <p:par>
+                                <p:cTn id="11" presetID="1" presetClass="entr" presetSubtype="0" fill="hold" grpId="0" nodeType="clickEffect">
+                                  <p:stCondLst>
+                                    <p:cond delay="0"/>
+                                  </p:stCondLst>
+                                  <p:childTnLst>
+                                    <p:set>
+                                      <p:cBhvr>
+                                        <p:cTn id="12" dur="1" fill="hold">
+                                          <p:stCondLst>
+                                            <p:cond delay="0"/>
+                                          </p:stCondLst>
+                                        </p:cTn>
+                                        <p:tgtEl>
+                                          <p:spTgt spid="4">
+                                            <p:txEl>
+                                              <p:pRg st="1" end="1"/>
+                                            </p:txEl>
+                                          </p:spTgt>
+                                        </p:tgtEl>
+                                        <p:attrNameLst>
+                                          <p:attrName>style.visibility</p:attrName>
+                                        </p:attrNameLst>
+                                      </p:cBhvr>
+                                      <p:to>
+                                        <p:strVal val="visible"/>
+                                      </p:to>
+                                    </p:set>
+                                  </p:childTnLst>
+                                </p:cTn>
+                              </p:par>
+                              <p:par>
+                                <p:cTn id="13" presetID="1" presetClass="entr" presetSubtype="0" fill="hold" grpId="0" nodeType="withEffect">
+                                  <p:stCondLst>
+                                    <p:cond delay="0"/>
+                                  </p:stCondLst>
+                                  <p:childTnLst>
+                                    <p:set>
+                                      <p:cBhvr>
+                                        <p:cTn id="14" dur="1" fill="hold">
+                                          <p:stCondLst>
+                                            <p:cond delay="0"/>
+                                          </p:stCondLst>
+                                        </p:cTn>
+                                        <p:tgtEl>
+                                          <p:spTgt spid="6">
+                                            <p:txEl>
+                                              <p:pRg st="1" end="1"/>
+                                            </p:txEl>
+                                          </p:spTgt>
+                                        </p:tgtEl>
+                                        <p:attrNameLst>
+                                          <p:attrName>style.visibility</p:attrName>
+                                        </p:attrNameLst>
+                                      </p:cBhvr>
+                                      <p:to>
+                                        <p:strVal val="visible"/>
+                                      </p:to>
+                                    </p:set>
+                                  </p:childTnLst>
+                                </p:cTn>
+                              </p:par>
+                            </p:childTnLst>
+                          </p:cTn>
+                        </p:par>
+                      </p:childTnLst>
+                    </p:cTn>
+                  </p:par>
+                  <p:par>
+                    <p:cTn id="15" fill="hold">
+                      <p:stCondLst>
+                        <p:cond delay="indefinite"/>
+                      </p:stCondLst>
+                      <p:childTnLst>
+                        <p:par>
+                          <p:cTn id="16" fill="hold">
+                            <p:stCondLst>
+                              <p:cond delay="0"/>
+                            </p:stCondLst>
+                            <p:childTnLst>
+                              <p:par>
+                                <p:cTn id="17" presetID="1" presetClass="entr" presetSubtype="0" fill="hold" grpId="0" nodeType="clickEffect">
+                                  <p:stCondLst>
+                                    <p:cond delay="0"/>
+                                  </p:stCondLst>
+                                  <p:childTnLst>
+                                    <p:set>
+                                      <p:cBhvr>
+                                        <p:cTn id="18" dur="1" fill="hold">
+                                          <p:stCondLst>
+                                            <p:cond delay="0"/>
+                                          </p:stCondLst>
+                                        </p:cTn>
+                                        <p:tgtEl>
+                                          <p:spTgt spid="4">
+                                            <p:txEl>
+                                              <p:pRg st="3" end="3"/>
+                                            </p:txEl>
+                                          </p:spTgt>
+                                        </p:tgtEl>
+                                        <p:attrNameLst>
+                                          <p:attrName>style.visibility</p:attrName>
+                                        </p:attrNameLst>
+                                      </p:cBhvr>
+                                      <p:to>
+                                        <p:strVal val="visible"/>
+                                      </p:to>
+                                    </p:set>
+                                  </p:childTnLst>
+                                </p:cTn>
+                              </p:par>
+                              <p:par>
+                                <p:cTn id="19" presetID="1" presetClass="entr" presetSubtype="0" fill="hold" grpId="0" nodeType="withEffect">
+                                  <p:stCondLst>
+                                    <p:cond delay="0"/>
+                                  </p:stCondLst>
+                                  <p:childTnLst>
+                                    <p:set>
+                                      <p:cBhvr>
+                                        <p:cTn id="20" dur="1" fill="hold">
+                                          <p:stCondLst>
+                                            <p:cond delay="0"/>
+                                          </p:stCondLst>
+                                        </p:cTn>
+                                        <p:tgtEl>
+                                          <p:spTgt spid="6">
+                                            <p:txEl>
+                                              <p:pRg st="2" end="2"/>
+                                            </p:txEl>
+                                          </p:spTgt>
+                                        </p:tgtEl>
+                                        <p:attrNameLst>
+                                          <p:attrName>style.visibility</p:attrName>
+                                        </p:attrNameLst>
+                                      </p:cBhvr>
+                                      <p:to>
+                                        <p:strVal val="visible"/>
+                                      </p:to>
+                                    </p:set>
+                                  </p:childTnLst>
+                                </p:cTn>
+                              </p:par>
+                            </p:childTnLst>
+                          </p:cTn>
+                        </p:par>
+                      </p:childTnLst>
+                    </p:cTn>
+                  </p:par>
+                  <p:par>
+                    <p:cTn id="21" fill="hold">
+                      <p:stCondLst>
+                        <p:cond delay="indefinite"/>
+                      </p:stCondLst>
+                      <p:childTnLst>
+                        <p:par>
+                          <p:cTn id="22" fill="hold">
+                            <p:stCondLst>
+                              <p:cond delay="0"/>
+                            </p:stCondLst>
+                            <p:childTnLst>
+                              <p:par>
+                                <p:cTn id="23" presetID="1" presetClass="entr" presetSubtype="0" fill="hold" grpId="0" nodeType="clickEffect">
+                                  <p:stCondLst>
+                                    <p:cond delay="0"/>
+                                  </p:stCondLst>
+                                  <p:childTnLst>
+                                    <p:set>
+                                      <p:cBhvr>
+                                        <p:cTn id="24" dur="1" fill="hold">
+                                          <p:stCondLst>
+                                            <p:cond delay="0"/>
+                                          </p:stCondLst>
+                                        </p:cTn>
+                                        <p:tgtEl>
+                                          <p:spTgt spid="4">
+                                            <p:txEl>
+                                              <p:pRg st="4" end="4"/>
+                                            </p:txEl>
+                                          </p:spTgt>
+                                        </p:tgtEl>
+                                        <p:attrNameLst>
+                                          <p:attrName>style.visibility</p:attrName>
+                                        </p:attrNameLst>
+                                      </p:cBhvr>
+                                      <p:to>
+                                        <p:strVal val="visible"/>
+                                      </p:to>
+                                    </p:set>
+                                  </p:childTnLst>
+                                </p:cTn>
+                              </p:par>
+                              <p:par>
+                                <p:cTn id="25" presetID="1" presetClass="entr" presetSubtype="0" fill="hold" grpId="0" nodeType="withEffect">
+                                  <p:stCondLst>
+                                    <p:cond delay="0"/>
+                                  </p:stCondLst>
+                                  <p:childTnLst>
+                                    <p:set>
+                                      <p:cBhvr>
+                                        <p:cTn id="26" dur="1" fill="hold">
+                                          <p:stCondLst>
+                                            <p:cond delay="0"/>
+                                          </p:stCondLst>
+                                        </p:cTn>
+                                        <p:tgtEl>
+                                          <p:spTgt spid="6">
+                                            <p:txEl>
+                                              <p:pRg st="3" end="3"/>
+                                            </p:txEl>
+                                          </p:spTgt>
+                                        </p:tgtEl>
+                                        <p:attrNameLst>
+                                          <p:attrName>style.visibility</p:attrName>
+                                        </p:attrNameLst>
+                                      </p:cBhvr>
+                                      <p:to>
+                                        <p:strVal val="visible"/>
+                                      </p:to>
+                                    </p:set>
+                                  </p:childTnLst>
+                                </p:cTn>
+                              </p:par>
+                            </p:childTnLst>
+                          </p:cTn>
+                        </p:par>
+                      </p:childTnLst>
+                    </p:cTn>
+                  </p:par>
+                  <p:par>
+                    <p:cTn id="27" fill="hold">
+                      <p:stCondLst>
+                        <p:cond delay="indefinite"/>
+                      </p:stCondLst>
+                      <p:childTnLst>
+                        <p:par>
+                          <p:cTn id="28" fill="hold">
+                            <p:stCondLst>
+                              <p:cond delay="0"/>
+                            </p:stCondLst>
+                            <p:childTnLst>
+                              <p:par>
+                                <p:cTn id="29" presetID="1" presetClass="entr" presetSubtype="0" fill="hold" grpId="0" nodeType="clickEffect">
+                                  <p:stCondLst>
+                                    <p:cond delay="0"/>
+                                  </p:stCondLst>
+                                  <p:childTnLst>
+                                    <p:set>
+                                      <p:cBhvr>
+                                        <p:cTn id="30" dur="1" fill="hold">
+                                          <p:stCondLst>
+                                            <p:cond delay="0"/>
+                                          </p:stCondLst>
+                                        </p:cTn>
+                                        <p:tgtEl>
+                                          <p:spTgt spid="4">
+                                            <p:txEl>
+                                              <p:pRg st="5" end="5"/>
+                                            </p:txEl>
+                                          </p:spTgt>
+                                        </p:tgtEl>
+                                        <p:attrNameLst>
+                                          <p:attrName>style.visibility</p:attrName>
+                                        </p:attrNameLst>
+                                      </p:cBhvr>
+                                      <p:to>
+                                        <p:strVal val="visible"/>
+                                      </p:to>
+                                    </p:set>
+                                  </p:childTnLst>
+                                </p:cTn>
+                              </p:par>
+                              <p:par>
+                                <p:cTn id="31" presetID="1" presetClass="entr" presetSubtype="0" fill="hold" grpId="0" nodeType="withEffect">
+                                  <p:stCondLst>
+                                    <p:cond delay="0"/>
+                                  </p:stCondLst>
+                                  <p:childTnLst>
+                                    <p:set>
+                                      <p:cBhvr>
+                                        <p:cTn id="32" dur="1" fill="hold">
+                                          <p:stCondLst>
+                                            <p:cond delay="0"/>
+                                          </p:stCondLst>
+                                        </p:cTn>
+                                        <p:tgtEl>
+                                          <p:spTgt spid="6">
+                                            <p:txEl>
+                                              <p:pRg st="5" end="5"/>
+                                            </p:txEl>
+                                          </p:spTgt>
+                                        </p:tgtEl>
+                                        <p:attrNameLst>
+                                          <p:attrName>style.visibility</p:attrName>
+                                        </p:attrNameLst>
+                                      </p:cBhvr>
+                                      <p:to>
+                                        <p:strVal val="visible"/>
+                                      </p:to>
+                                    </p:set>
+                                  </p:childTnLst>
+                                </p:cTn>
+                              </p:par>
+                            </p:childTnLst>
+                          </p:cTn>
+                        </p:par>
+                      </p:childTnLst>
+                    </p:cTn>
+                  </p:par>
+                  <p:par>
+                    <p:cTn id="33" fill="hold">
+                      <p:stCondLst>
+                        <p:cond delay="indefinite"/>
+                      </p:stCondLst>
+                      <p:childTnLst>
+                        <p:par>
+                          <p:cTn id="34" fill="hold">
+                            <p:stCondLst>
+                              <p:cond delay="0"/>
+                            </p:stCondLst>
+                            <p:childTnLst>
+                              <p:par>
+                                <p:cTn id="35" presetID="1" presetClass="entr" presetSubtype="0" fill="hold" grpId="0" nodeType="clickEffect">
+                                  <p:stCondLst>
+                                    <p:cond delay="0"/>
+                                  </p:stCondLst>
+                                  <p:childTnLst>
+                                    <p:set>
+                                      <p:cBhvr>
+                                        <p:cTn id="36" dur="1" fill="hold">
+                                          <p:stCondLst>
+                                            <p:cond delay="0"/>
+                                          </p:stCondLst>
+                                        </p:cTn>
+                                        <p:tgtEl>
+                                          <p:spTgt spid="6">
+                                            <p:txEl>
+                                              <p:pRg st="6" end="6"/>
+                                            </p:txEl>
+                                          </p:spTgt>
+                                        </p:tgtEl>
+                                        <p:attrNameLst>
+                                          <p:attrName>style.visibility</p:attrName>
+                                        </p:attrNameLst>
+                                      </p:cBhvr>
+                                      <p:to>
+                                        <p:strVal val="visible"/>
+                                      </p:to>
+                                    </p:set>
+                                  </p:childTnLst>
+                                </p:cTn>
+                              </p:par>
+                            </p:childTnLst>
+                          </p:cTn>
+                        </p:par>
+                      </p:childTnLst>
+                    </p:cTn>
+                  </p:par>
+                </p:childTnLst>
+              </p:cTn>
+              <p:prevCondLst>
+                <p:cond evt="onPrev" delay="0">
+                  <p:tgtEl>
+                    <p:sldTgt/>
+                  </p:tgtEl>
+                </p:cond>
+              </p:prevCondLst>
+              <p:nextCondLst>
+                <p:cond evt="onNext" delay="0">
+                  <p:tgtEl>
+                    <p:sldTgt/>
+                  </p:tgtEl>
+                </p:cond>
+              </p:nextCondLst>
+            </p:seq>
+          </p:childTnLst>
+        </p:cTn>
       </p:par>
     </p:tnLst>
+    <p:bldLst>
+      <p:bldP spid="4" grpId="0" uiExpand="1" build="p"/>
+      <p:bldP spid="6" grpId="0" uiExpand="1" build="p"/>
+    </p:bldLst>
   </p:timing>
 </p:sld>
 </file>
@@ -7103,6 +9195,21 @@
     </p:tnLst>
   </p:timing>
 </p:sld>
+</file>
+
+<file path=ppt/tags/tag1.xml><?xml version="1.0" encoding="utf-8"?>
+<p:tagLst xmlns:a="http://schemas.openxmlformats.org/drawingml/2006/main" xmlns:r="http://schemas.openxmlformats.org/officeDocument/2006/relationships" xmlns:p="http://schemas.openxmlformats.org/presentationml/2006/main">
+  <p:tag name="ISFOXLABELUSERINTERACTION" val="True"/>
+  <p:tag name="ISFOXCLASSIFICATIONID" val="7d788e96-5802-48f7-b87f-ef0226e41b7c"/>
+  <p:tag name="ISFOXCLASSIFICATIONNAME" val="Public"/>
+  <p:tag name="ISFOXPREFIX" val="HvS"/>
+  <p:tag name="ISFOXSHOWCLASSIFICATIONREQUESTDIALOG" val="False"/>
+  <p:tag name="A71660D270C64F5BBB8F27F5E85BE6370" val="HVS\grams;7d788e96-5802-48f7-b87f-ef0226e41b7c;Public;2019-08-28T13:28:33;;HvS|"/>
+  <p:tag name="A71660D270C64F5BBB8F27F5E85BE630" val="1"/>
+  <p:tag name="ISFOXOLDCLASSIFICATIONID" val="7d788e96-5802-48f7-b87f-ef0226e41b7c"/>
+  <p:tag name="ISFOXCLASSIFICATIONINKEYWORDS" val="Public"/>
+  <p:tag name="ISFOXDOVERSIONINGONSAVE" val="0"/>
+</p:tagLst>
 </file>
 
 <file path=ppt/theme/theme1.xml><?xml version="1.0" encoding="utf-8"?>

</xml_diff>